<commit_message>
Embed audio, pencil jpg, and UUID cSld name
</commit_message>
<xml_diff>
--- a/source1.pptx
+++ b/source1.pptx
@@ -4,6 +4,12 @@
   <p:sldMasterIdLst>
     <p:sldMasterId id="2147483648" r:id="rId1"/>
   </p:sldMasterIdLst>
+  <p:notesMasterIdLst>
+    <p:notesMasterId r:id="rId5"/>
+  </p:notesMasterIdLst>
+  <p:handoutMasterIdLst>
+    <p:handoutMasterId r:id="rId6"/>
+  </p:handoutMasterIdLst>
   <p:sldIdLst>
     <p:sldId id="256" r:id="rId2"/>
     <p:sldId id="257" r:id="rId3"/>
@@ -106,11 +112,575 @@
       </a:defRPr>
     </a:lvl9pPr>
   </p:defaultTextStyle>
+  <p:extLst>
+    <p:ext uri="{EFAFB233-063F-42B5-8137-9DF3F51BA10A}">
+      <p15:sldGuideLst xmlns:p15="http://schemas.microsoft.com/office/powerpoint/2012/main"/>
+    </p:ext>
+    <p:ext uri="{2D200454-40CA-4A62-9FC3-DE9A4176ACB9}">
+      <p15:notesGuideLst xmlns:p15="http://schemas.microsoft.com/office/powerpoint/2012/main"/>
+    </p:ext>
+  </p:extLst>
 </p:presentation>
 </file>
 
+<file path=ppt/handoutMasters/handoutMaster1.xml><?xml version="1.0" encoding="utf-8"?>
+<p:handoutMaster xmlns:a="http://schemas.openxmlformats.org/drawingml/2006/main" xmlns:r="http://schemas.openxmlformats.org/officeDocument/2006/relationships" xmlns:p="http://schemas.openxmlformats.org/presentationml/2006/main">
+  <p:cSld>
+    <p:bg>
+      <p:bgRef idx="1001">
+        <a:schemeClr val="bg1"/>
+      </p:bgRef>
+    </p:bg>
+    <p:spTree>
+      <p:nvGrpSpPr>
+        <p:cNvPr id="1" name=""/>
+        <p:cNvGrpSpPr/>
+        <p:nvPr/>
+      </p:nvGrpSpPr>
+      <p:grpSpPr>
+        <a:xfrm>
+          <a:off x="0" y="0"/>
+          <a:ext cx="0" cy="0"/>
+          <a:chOff x="0" y="0"/>
+          <a:chExt cx="0" cy="0"/>
+        </a:xfrm>
+      </p:grpSpPr>
+      <p:sp>
+        <p:nvSpPr>
+          <p:cNvPr id="2" name="Header Placeholder 1">
+            <a:extLst>
+              <a:ext uri="{FF2B5EF4-FFF2-40B4-BE49-F238E27FC236}">
+                <a16:creationId xmlns:a16="http://schemas.microsoft.com/office/drawing/2014/main" id="{37E68FE4-6BBA-D442-816C-4579F7E12A64}"/>
+              </a:ext>
+            </a:extLst>
+          </p:cNvPr>
+          <p:cNvSpPr>
+            <a:spLocks noGrp="1"/>
+          </p:cNvSpPr>
+          <p:nvPr>
+            <p:ph type="hdr" sz="quarter"/>
+          </p:nvPr>
+        </p:nvSpPr>
+        <p:spPr>
+          <a:xfrm>
+            <a:off x="0" y="1"/>
+            <a:ext cx="2971800" cy="458788"/>
+          </a:xfrm>
+          <a:prstGeom prst="rect">
+            <a:avLst/>
+          </a:prstGeom>
+        </p:spPr>
+        <p:txBody>
+          <a:bodyPr vert="horz" lIns="91440" tIns="45720" rIns="91440" bIns="45720" rtlCol="0"/>
+          <a:lstStyle>
+            <a:lvl1pPr algn="l">
+              <a:defRPr sz="1200"/>
+            </a:lvl1pPr>
+          </a:lstStyle>
+          <a:p>
+            <a:endParaRPr lang="en-US"/>
+          </a:p>
+        </p:txBody>
+      </p:sp>
+      <p:sp>
+        <p:nvSpPr>
+          <p:cNvPr id="3" name="Date Placeholder 2">
+            <a:extLst>
+              <a:ext uri="{FF2B5EF4-FFF2-40B4-BE49-F238E27FC236}">
+                <a16:creationId xmlns:a16="http://schemas.microsoft.com/office/drawing/2014/main" id="{4BE9EB1A-A755-4C4E-971F-AB3DEA58DB2D}"/>
+              </a:ext>
+            </a:extLst>
+          </p:cNvPr>
+          <p:cNvSpPr>
+            <a:spLocks noGrp="1"/>
+          </p:cNvSpPr>
+          <p:nvPr>
+            <p:ph type="dt" sz="quarter" idx="1"/>
+          </p:nvPr>
+        </p:nvSpPr>
+        <p:spPr>
+          <a:xfrm>
+            <a:off x="3884613" y="1"/>
+            <a:ext cx="2971800" cy="458788"/>
+          </a:xfrm>
+          <a:prstGeom prst="rect">
+            <a:avLst/>
+          </a:prstGeom>
+        </p:spPr>
+        <p:txBody>
+          <a:bodyPr vert="horz" lIns="91440" tIns="45720" rIns="91440" bIns="45720" rtlCol="0"/>
+          <a:lstStyle>
+            <a:lvl1pPr algn="r">
+              <a:defRPr sz="1200"/>
+            </a:lvl1pPr>
+          </a:lstStyle>
+          <a:p>
+            <a:fld id="{84A0DA63-6C45-3A4C-A865-65FA62292074}" type="datetimeFigureOut">
+              <a:rPr lang="en-US" smtClean="0"/>
+              <a:t>2/11/21</a:t>
+            </a:fld>
+            <a:endParaRPr lang="en-US"/>
+          </a:p>
+        </p:txBody>
+      </p:sp>
+      <p:sp>
+        <p:nvSpPr>
+          <p:cNvPr id="4" name="Footer Placeholder 3">
+            <a:extLst>
+              <a:ext uri="{FF2B5EF4-FFF2-40B4-BE49-F238E27FC236}">
+                <a16:creationId xmlns:a16="http://schemas.microsoft.com/office/drawing/2014/main" id="{4D03EBC7-0B75-524E-9F1B-390070C3E52F}"/>
+              </a:ext>
+            </a:extLst>
+          </p:cNvPr>
+          <p:cNvSpPr>
+            <a:spLocks noGrp="1"/>
+          </p:cNvSpPr>
+          <p:nvPr>
+            <p:ph type="ftr" sz="quarter" idx="2"/>
+          </p:nvPr>
+        </p:nvSpPr>
+        <p:spPr>
+          <a:xfrm>
+            <a:off x="0" y="8685213"/>
+            <a:ext cx="2971800" cy="458787"/>
+          </a:xfrm>
+          <a:prstGeom prst="rect">
+            <a:avLst/>
+          </a:prstGeom>
+        </p:spPr>
+        <p:txBody>
+          <a:bodyPr vert="horz" lIns="91440" tIns="45720" rIns="91440" bIns="45720" rtlCol="0" anchor="b"/>
+          <a:lstStyle>
+            <a:lvl1pPr algn="l">
+              <a:defRPr sz="1200"/>
+            </a:lvl1pPr>
+          </a:lstStyle>
+          <a:p>
+            <a:endParaRPr lang="en-US"/>
+          </a:p>
+        </p:txBody>
+      </p:sp>
+      <p:sp>
+        <p:nvSpPr>
+          <p:cNvPr id="5" name="Slide Number Placeholder 4">
+            <a:extLst>
+              <a:ext uri="{FF2B5EF4-FFF2-40B4-BE49-F238E27FC236}">
+                <a16:creationId xmlns:a16="http://schemas.microsoft.com/office/drawing/2014/main" id="{126564BC-E2C4-8F4A-85A1-D7FBFE3F9770}"/>
+              </a:ext>
+            </a:extLst>
+          </p:cNvPr>
+          <p:cNvSpPr>
+            <a:spLocks noGrp="1"/>
+          </p:cNvSpPr>
+          <p:nvPr>
+            <p:ph type="sldNum" sz="quarter" idx="3"/>
+          </p:nvPr>
+        </p:nvSpPr>
+        <p:spPr>
+          <a:xfrm>
+            <a:off x="3884613" y="8685213"/>
+            <a:ext cx="2971800" cy="458787"/>
+          </a:xfrm>
+          <a:prstGeom prst="rect">
+            <a:avLst/>
+          </a:prstGeom>
+        </p:spPr>
+        <p:txBody>
+          <a:bodyPr vert="horz" lIns="91440" tIns="45720" rIns="91440" bIns="45720" rtlCol="0" anchor="b"/>
+          <a:lstStyle>
+            <a:lvl1pPr algn="r">
+              <a:defRPr sz="1200"/>
+            </a:lvl1pPr>
+          </a:lstStyle>
+          <a:p>
+            <a:fld id="{6DB37330-51BA-5144-B67C-7C833AA601EE}" type="slidenum">
+              <a:rPr lang="en-US" smtClean="0"/>
+              <a:t>‹#›</a:t>
+            </a:fld>
+            <a:endParaRPr lang="en-US"/>
+          </a:p>
+        </p:txBody>
+      </p:sp>
+    </p:spTree>
+    <p:extLst>
+      <p:ext uri="{BB962C8B-B14F-4D97-AF65-F5344CB8AC3E}">
+        <p14:creationId xmlns:p14="http://schemas.microsoft.com/office/powerpoint/2010/main" val="3454707221"/>
+      </p:ext>
+    </p:extLst>
+  </p:cSld>
+  <p:clrMap bg1="lt1" tx1="dk1" bg2="lt2" tx2="dk2" accent1="accent1" accent2="accent2" accent3="accent3" accent4="accent4" accent5="accent5" accent6="accent6" hlink="hlink" folHlink="folHlink"/>
+</p:handoutMaster>
+</file>
+
+<file path=ppt/notesMasters/notesMaster1.xml><?xml version="1.0" encoding="utf-8"?>
+<p:notesMaster xmlns:a="http://schemas.openxmlformats.org/drawingml/2006/main" xmlns:r="http://schemas.openxmlformats.org/officeDocument/2006/relationships" xmlns:p="http://schemas.openxmlformats.org/presentationml/2006/main">
+  <p:cSld>
+    <p:bg>
+      <p:bgRef idx="1001">
+        <a:schemeClr val="bg1"/>
+      </p:bgRef>
+    </p:bg>
+    <p:spTree>
+      <p:nvGrpSpPr>
+        <p:cNvPr id="1" name=""/>
+        <p:cNvGrpSpPr/>
+        <p:nvPr/>
+      </p:nvGrpSpPr>
+      <p:grpSpPr>
+        <a:xfrm>
+          <a:off x="0" y="0"/>
+          <a:ext cx="0" cy="0"/>
+          <a:chOff x="0" y="0"/>
+          <a:chExt cx="0" cy="0"/>
+        </a:xfrm>
+      </p:grpSpPr>
+      <p:sp>
+        <p:nvSpPr>
+          <p:cNvPr id="2" name="Header Placeholder 1"/>
+          <p:cNvSpPr>
+            <a:spLocks noGrp="1"/>
+          </p:cNvSpPr>
+          <p:nvPr>
+            <p:ph type="hdr" sz="quarter"/>
+          </p:nvPr>
+        </p:nvSpPr>
+        <p:spPr>
+          <a:xfrm>
+            <a:off x="0" y="1"/>
+            <a:ext cx="2971800" cy="458788"/>
+          </a:xfrm>
+          <a:prstGeom prst="rect">
+            <a:avLst/>
+          </a:prstGeom>
+        </p:spPr>
+        <p:txBody>
+          <a:bodyPr vert="horz" lIns="91440" tIns="45720" rIns="91440" bIns="45720" rtlCol="0"/>
+          <a:lstStyle>
+            <a:lvl1pPr algn="l">
+              <a:defRPr sz="1200"/>
+            </a:lvl1pPr>
+          </a:lstStyle>
+          <a:p>
+            <a:endParaRPr lang="en-US"/>
+          </a:p>
+        </p:txBody>
+      </p:sp>
+      <p:sp>
+        <p:nvSpPr>
+          <p:cNvPr id="5" name="Notes Placeholder 4"/>
+          <p:cNvSpPr>
+            <a:spLocks noGrp="1"/>
+          </p:cNvSpPr>
+          <p:nvPr>
+            <p:ph type="body" sz="quarter" idx="3"/>
+          </p:nvPr>
+        </p:nvSpPr>
+        <p:spPr>
+          <a:xfrm>
+            <a:off x="685800" y="4400549"/>
+            <a:ext cx="5486400" cy="3600451"/>
+          </a:xfrm>
+          <a:prstGeom prst="rect">
+            <a:avLst/>
+          </a:prstGeom>
+        </p:spPr>
+        <p:txBody>
+          <a:bodyPr vert="horz" lIns="91440" tIns="45720" rIns="91440" bIns="45720" rtlCol="0"/>
+          <a:lstStyle/>
+          <a:p>
+            <a:pPr lvl="0"/>
+            <a:r>
+              <a:rPr lang="en-US"/>
+              <a:t>Click to edit Master text styles</a:t>
+            </a:r>
+          </a:p>
+          <a:p>
+            <a:pPr lvl="1"/>
+            <a:r>
+              <a:rPr lang="en-US"/>
+              <a:t>Second level</a:t>
+            </a:r>
+          </a:p>
+          <a:p>
+            <a:pPr lvl="2"/>
+            <a:r>
+              <a:rPr lang="en-US"/>
+              <a:t>Third level</a:t>
+            </a:r>
+          </a:p>
+          <a:p>
+            <a:pPr lvl="3"/>
+            <a:r>
+              <a:rPr lang="en-US"/>
+              <a:t>Fourth level</a:t>
+            </a:r>
+          </a:p>
+          <a:p>
+            <a:pPr lvl="4"/>
+            <a:r>
+              <a:rPr lang="en-US"/>
+              <a:t>Fifth level</a:t>
+            </a:r>
+          </a:p>
+        </p:txBody>
+      </p:sp>
+      <p:sp>
+        <p:nvSpPr>
+          <p:cNvPr id="7" name="Slide Number Placeholder 6"/>
+          <p:cNvSpPr>
+            <a:spLocks noGrp="1"/>
+          </p:cNvSpPr>
+          <p:nvPr>
+            <p:ph type="sldNum" sz="quarter" idx="5"/>
+          </p:nvPr>
+        </p:nvSpPr>
+        <p:spPr>
+          <a:xfrm>
+            <a:off x="3884613" y="8685213"/>
+            <a:ext cx="2971800" cy="458787"/>
+          </a:xfrm>
+          <a:prstGeom prst="rect">
+            <a:avLst/>
+          </a:prstGeom>
+        </p:spPr>
+        <p:txBody>
+          <a:bodyPr vert="horz" lIns="91440" tIns="45720" rIns="91440" bIns="45720" rtlCol="0" anchor="b"/>
+          <a:lstStyle>
+            <a:lvl1pPr algn="r">
+              <a:defRPr sz="1200"/>
+            </a:lvl1pPr>
+          </a:lstStyle>
+          <a:p>
+            <a:fld id="{D736E5C3-CAA7-F046-8FAC-50DBCF25B511}" type="slidenum">
+              <a:rPr lang="en-US" smtClean="0"/>
+              <a:t>‹#›</a:t>
+            </a:fld>
+            <a:endParaRPr lang="en-US"/>
+          </a:p>
+        </p:txBody>
+      </p:sp>
+      <p:sp>
+        <p:nvSpPr>
+          <p:cNvPr id="8" name="Footer Placeholder 7">
+            <a:extLst>
+              <a:ext uri="{FF2B5EF4-FFF2-40B4-BE49-F238E27FC236}">
+                <a16:creationId xmlns:a16="http://schemas.microsoft.com/office/drawing/2014/main" id="{93EA4A7C-5D63-6C44-ABD7-1069E84F2A01}"/>
+              </a:ext>
+            </a:extLst>
+          </p:cNvPr>
+          <p:cNvSpPr>
+            <a:spLocks noGrp="1"/>
+          </p:cNvSpPr>
+          <p:nvPr>
+            <p:ph type="ftr" sz="quarter" idx="4"/>
+          </p:nvPr>
+        </p:nvSpPr>
+        <p:spPr>
+          <a:xfrm>
+            <a:off x="0" y="8685213"/>
+            <a:ext cx="2971800" cy="458787"/>
+          </a:xfrm>
+          <a:prstGeom prst="rect">
+            <a:avLst/>
+          </a:prstGeom>
+        </p:spPr>
+        <p:txBody>
+          <a:bodyPr vert="horz" lIns="91440" tIns="45720" rIns="91440" bIns="45720" rtlCol="0" anchor="b"/>
+          <a:lstStyle>
+            <a:lvl1pPr algn="l">
+              <a:defRPr sz="1200"/>
+            </a:lvl1pPr>
+          </a:lstStyle>
+          <a:p>
+            <a:endParaRPr lang="en-US"/>
+          </a:p>
+        </p:txBody>
+      </p:sp>
+      <p:sp>
+        <p:nvSpPr>
+          <p:cNvPr id="11" name="Slide Image Placeholder 10">
+            <a:extLst>
+              <a:ext uri="{FF2B5EF4-FFF2-40B4-BE49-F238E27FC236}">
+                <a16:creationId xmlns:a16="http://schemas.microsoft.com/office/drawing/2014/main" id="{A21BC0B0-B14F-5E42-8BCC-99600FCD7E5C}"/>
+              </a:ext>
+            </a:extLst>
+          </p:cNvPr>
+          <p:cNvSpPr>
+            <a:spLocks noGrp="1" noRot="1" noChangeAspect="1"/>
+          </p:cNvSpPr>
+          <p:nvPr>
+            <p:ph type="sldImg" idx="2"/>
+          </p:nvPr>
+        </p:nvSpPr>
+        <p:spPr>
+          <a:xfrm>
+            <a:off x="685800" y="1143000"/>
+            <a:ext cx="5486400" cy="3086100"/>
+          </a:xfrm>
+          <a:prstGeom prst="rect">
+            <a:avLst/>
+          </a:prstGeom>
+          <a:noFill/>
+          <a:ln w="12700">
+            <a:solidFill>
+              <a:prstClr val="black"/>
+            </a:solidFill>
+          </a:ln>
+        </p:spPr>
+        <p:txBody>
+          <a:bodyPr vert="horz" lIns="91440" tIns="45720" rIns="91440" bIns="45720" rtlCol="0" anchor="ctr"/>
+          <a:lstStyle/>
+          <a:p>
+            <a:endParaRPr lang="en-US"/>
+          </a:p>
+        </p:txBody>
+      </p:sp>
+      <p:sp>
+        <p:nvSpPr>
+          <p:cNvPr id="13" name="Date Placeholder 12">
+            <a:extLst>
+              <a:ext uri="{FF2B5EF4-FFF2-40B4-BE49-F238E27FC236}">
+                <a16:creationId xmlns:a16="http://schemas.microsoft.com/office/drawing/2014/main" id="{B58F4D32-CD4C-C142-B8A2-3BD38BD7170E}"/>
+              </a:ext>
+            </a:extLst>
+          </p:cNvPr>
+          <p:cNvSpPr>
+            <a:spLocks noGrp="1"/>
+          </p:cNvSpPr>
+          <p:nvPr>
+            <p:ph type="dt" idx="1"/>
+          </p:nvPr>
+        </p:nvSpPr>
+        <p:spPr>
+          <a:xfrm>
+            <a:off x="3884613" y="0"/>
+            <a:ext cx="2971800" cy="458788"/>
+          </a:xfrm>
+          <a:prstGeom prst="rect">
+            <a:avLst/>
+          </a:prstGeom>
+        </p:spPr>
+        <p:txBody>
+          <a:bodyPr vert="horz" lIns="91440" tIns="45720" rIns="91440" bIns="45720" rtlCol="0"/>
+          <a:lstStyle>
+            <a:lvl1pPr algn="r">
+              <a:defRPr sz="1200"/>
+            </a:lvl1pPr>
+          </a:lstStyle>
+          <a:p>
+            <a:fld id="{3C803709-663E-E440-95D0-02136FB6A93F}" type="datetimeFigureOut">
+              <a:rPr lang="en-US" smtClean="0"/>
+              <a:t>2/11/21</a:t>
+            </a:fld>
+            <a:endParaRPr lang="en-US"/>
+          </a:p>
+        </p:txBody>
+      </p:sp>
+    </p:spTree>
+    <p:extLst>
+      <p:ext uri="{BB962C8B-B14F-4D97-AF65-F5344CB8AC3E}">
+        <p14:creationId xmlns:p14="http://schemas.microsoft.com/office/powerpoint/2010/main" val="3527038468"/>
+      </p:ext>
+    </p:extLst>
+  </p:cSld>
+  <p:clrMap bg1="lt1" tx1="dk1" bg2="lt2" tx2="dk2" accent1="accent1" accent2="accent2" accent3="accent3" accent4="accent4" accent5="accent5" accent6="accent6" hlink="hlink" folHlink="folHlink"/>
+  <p:notesStyle>
+    <a:lvl1pPr marL="0" algn="l" defTabSz="914400" rtl="0" eaLnBrk="1" latinLnBrk="0" hangingPunct="1">
+      <a:defRPr sz="1200" kern="1200">
+        <a:solidFill>
+          <a:schemeClr val="tx1"/>
+        </a:solidFill>
+        <a:latin typeface="+mn-lt"/>
+        <a:ea typeface="+mn-ea"/>
+        <a:cs typeface="+mn-cs"/>
+      </a:defRPr>
+    </a:lvl1pPr>
+    <a:lvl2pPr marL="457200" algn="l" defTabSz="914400" rtl="0" eaLnBrk="1" latinLnBrk="0" hangingPunct="1">
+      <a:defRPr sz="1200" kern="1200">
+        <a:solidFill>
+          <a:schemeClr val="tx1"/>
+        </a:solidFill>
+        <a:latin typeface="+mn-lt"/>
+        <a:ea typeface="+mn-ea"/>
+        <a:cs typeface="+mn-cs"/>
+      </a:defRPr>
+    </a:lvl2pPr>
+    <a:lvl3pPr marL="914400" algn="l" defTabSz="914400" rtl="0" eaLnBrk="1" latinLnBrk="0" hangingPunct="1">
+      <a:defRPr sz="1200" kern="1200">
+        <a:solidFill>
+          <a:schemeClr val="tx1"/>
+        </a:solidFill>
+        <a:latin typeface="+mn-lt"/>
+        <a:ea typeface="+mn-ea"/>
+        <a:cs typeface="+mn-cs"/>
+      </a:defRPr>
+    </a:lvl3pPr>
+    <a:lvl4pPr marL="1371600" algn="l" defTabSz="914400" rtl="0" eaLnBrk="1" latinLnBrk="0" hangingPunct="1">
+      <a:defRPr sz="1200" kern="1200">
+        <a:solidFill>
+          <a:schemeClr val="tx1"/>
+        </a:solidFill>
+        <a:latin typeface="+mn-lt"/>
+        <a:ea typeface="+mn-ea"/>
+        <a:cs typeface="+mn-cs"/>
+      </a:defRPr>
+    </a:lvl4pPr>
+    <a:lvl5pPr marL="1828800" algn="l" defTabSz="914400" rtl="0" eaLnBrk="1" latinLnBrk="0" hangingPunct="1">
+      <a:defRPr sz="1200" kern="1200">
+        <a:solidFill>
+          <a:schemeClr val="tx1"/>
+        </a:solidFill>
+        <a:latin typeface="+mn-lt"/>
+        <a:ea typeface="+mn-ea"/>
+        <a:cs typeface="+mn-cs"/>
+      </a:defRPr>
+    </a:lvl5pPr>
+    <a:lvl6pPr marL="2286000" algn="l" defTabSz="914400" rtl="0" eaLnBrk="1" latinLnBrk="0" hangingPunct="1">
+      <a:defRPr sz="1200" kern="1200">
+        <a:solidFill>
+          <a:schemeClr val="tx1"/>
+        </a:solidFill>
+        <a:latin typeface="+mn-lt"/>
+        <a:ea typeface="+mn-ea"/>
+        <a:cs typeface="+mn-cs"/>
+      </a:defRPr>
+    </a:lvl6pPr>
+    <a:lvl7pPr marL="2743200" algn="l" defTabSz="914400" rtl="0" eaLnBrk="1" latinLnBrk="0" hangingPunct="1">
+      <a:defRPr sz="1200" kern="1200">
+        <a:solidFill>
+          <a:schemeClr val="tx1"/>
+        </a:solidFill>
+        <a:latin typeface="+mn-lt"/>
+        <a:ea typeface="+mn-ea"/>
+        <a:cs typeface="+mn-cs"/>
+      </a:defRPr>
+    </a:lvl7pPr>
+    <a:lvl8pPr marL="3200400" algn="l" defTabSz="914400" rtl="0" eaLnBrk="1" latinLnBrk="0" hangingPunct="1">
+      <a:defRPr sz="1200" kern="1200">
+        <a:solidFill>
+          <a:schemeClr val="tx1"/>
+        </a:solidFill>
+        <a:latin typeface="+mn-lt"/>
+        <a:ea typeface="+mn-ea"/>
+        <a:cs typeface="+mn-cs"/>
+      </a:defRPr>
+    </a:lvl8pPr>
+    <a:lvl9pPr marL="3657600" algn="l" defTabSz="914400" rtl="0" eaLnBrk="1" latinLnBrk="0" hangingPunct="1">
+      <a:defRPr sz="1200" kern="1200">
+        <a:solidFill>
+          <a:schemeClr val="tx1"/>
+        </a:solidFill>
+        <a:latin typeface="+mn-lt"/>
+        <a:ea typeface="+mn-ea"/>
+        <a:cs typeface="+mn-cs"/>
+      </a:defRPr>
+    </a:lvl9pPr>
+  </p:notesStyle>
+</p:notesMaster>
+</file>
+
 <file path=ppt/slideLayouts/slideLayout1.xml><?xml version="1.0" encoding="utf-8"?>
-<p:sldLayout xmlns:a="http://schemas.openxmlformats.org/drawingml/2006/main" xmlns:r="http://schemas.openxmlformats.org/officeDocument/2006/relationships" xmlns:p="http://schemas.openxmlformats.org/presentationml/2006/main" type="title" preserve="1">
+<p:sldLayout xmlns:a="http://schemas.openxmlformats.org/drawingml/2006/main" xmlns:r="http://schemas.openxmlformats.org/officeDocument/2006/relationships" xmlns:p="http://schemas.openxmlformats.org/presentationml/2006/main" preserve="1" userDrawn="1">
   <p:cSld name="Title Slide">
     <p:spTree>
       <p:nvGrpSpPr>
@@ -128,43 +698,6 @@
       </p:grpSpPr>
       <p:sp>
         <p:nvSpPr>
-          <p:cNvPr id="2" name="Title 1">
-            <a:extLst>
-              <a:ext uri="{FF2B5EF4-FFF2-40B4-BE49-F238E27FC236}">
-                <a16:creationId xmlns:a16="http://schemas.microsoft.com/office/drawing/2014/main" id="{2B875D77-12E7-7040-9475-5F3266D2B6B6}"/>
-              </a:ext>
-            </a:extLst>
-          </p:cNvPr>
-          <p:cNvSpPr>
-            <a:spLocks noGrp="1"/>
-          </p:cNvSpPr>
-          <p:nvPr>
-            <p:ph type="ctrTitle"/>
-          </p:nvPr>
-        </p:nvSpPr>
-        <p:spPr>
-          <a:xfrm>
-            <a:off x="1524000" y="1122363"/>
-            <a:ext cx="9144000" cy="2387600"/>
-          </a:xfrm>
-        </p:spPr>
-        <p:txBody>
-          <a:bodyPr anchor="b"/>
-          <a:lstStyle>
-            <a:lvl1pPr algn="ctr">
-              <a:defRPr sz="6000"/>
-            </a:lvl1pPr>
-          </a:lstStyle>
-          <a:p>
-            <a:r>
-              <a:rPr lang="en-US"/>
-              <a:t>Click to edit Master title style</a:t>
-            </a:r>
-          </a:p>
-        </p:txBody>
-      </p:sp>
-      <p:sp>
-        <p:nvSpPr>
           <p:cNvPr id="3" name="Subtitle 2">
             <a:extLst>
               <a:ext uri="{FF2B5EF4-FFF2-40B4-BE49-F238E27FC236}">
@@ -235,10 +768,38 @@
       </p:sp>
       <p:sp>
         <p:nvSpPr>
-          <p:cNvPr id="4" name="Date Placeholder 3">
-            <a:extLst>
-              <a:ext uri="{FF2B5EF4-FFF2-40B4-BE49-F238E27FC236}">
-                <a16:creationId xmlns:a16="http://schemas.microsoft.com/office/drawing/2014/main" id="{5793339A-614C-D641-A01B-46D6CD94133E}"/>
+          <p:cNvPr id="7" name="Title 6">
+            <a:extLst>
+              <a:ext uri="{FF2B5EF4-FFF2-40B4-BE49-F238E27FC236}">
+                <a16:creationId xmlns:a16="http://schemas.microsoft.com/office/drawing/2014/main" id="{7653EF89-7DE6-B143-81E0-A50C235CD9BE}"/>
+              </a:ext>
+            </a:extLst>
+          </p:cNvPr>
+          <p:cNvSpPr>
+            <a:spLocks noGrp="1"/>
+          </p:cNvSpPr>
+          <p:nvPr>
+            <p:ph type="title"/>
+          </p:nvPr>
+        </p:nvSpPr>
+        <p:spPr/>
+        <p:txBody>
+          <a:bodyPr/>
+          <a:lstStyle/>
+          <a:p>
+            <a:r>
+              <a:rPr lang="en-US"/>
+              <a:t>Click to edit Master title style</a:t>
+            </a:r>
+          </a:p>
+        </p:txBody>
+      </p:sp>
+      <p:sp>
+        <p:nvSpPr>
+          <p:cNvPr id="8" name="Date Placeholder 7">
+            <a:extLst>
+              <a:ext uri="{FF2B5EF4-FFF2-40B4-BE49-F238E27FC236}">
+                <a16:creationId xmlns:a16="http://schemas.microsoft.com/office/drawing/2014/main" id="{58381486-BDCA-2745-BC96-E57CCBD214CE}"/>
               </a:ext>
             </a:extLst>
           </p:cNvPr>
@@ -256,7 +817,7 @@
           <a:p>
             <a:fld id="{B1585002-4978-8F48-8E24-AE6B89E7A5A1}" type="datetimeFigureOut">
               <a:rPr lang="en-US" smtClean="0"/>
-              <a:t>2/10/21</a:t>
+              <a:t>2/11/21</a:t>
             </a:fld>
             <a:endParaRPr lang="en-US"/>
           </a:p>
@@ -264,10 +825,10 @@
       </p:sp>
       <p:sp>
         <p:nvSpPr>
-          <p:cNvPr id="5" name="Footer Placeholder 4">
-            <a:extLst>
-              <a:ext uri="{FF2B5EF4-FFF2-40B4-BE49-F238E27FC236}">
-                <a16:creationId xmlns:a16="http://schemas.microsoft.com/office/drawing/2014/main" id="{85CF536D-137A-BC4A-9A21-10E9F1FC8743}"/>
+          <p:cNvPr id="9" name="Footer Placeholder 8">
+            <a:extLst>
+              <a:ext uri="{FF2B5EF4-FFF2-40B4-BE49-F238E27FC236}">
+                <a16:creationId xmlns:a16="http://schemas.microsoft.com/office/drawing/2014/main" id="{694D9C69-A76D-4040-AB73-F7E91B3C410D}"/>
               </a:ext>
             </a:extLst>
           </p:cNvPr>
@@ -289,10 +850,10 @@
       </p:sp>
       <p:sp>
         <p:nvSpPr>
-          <p:cNvPr id="6" name="Slide Number Placeholder 5">
-            <a:extLst>
-              <a:ext uri="{FF2B5EF4-FFF2-40B4-BE49-F238E27FC236}">
-                <a16:creationId xmlns:a16="http://schemas.microsoft.com/office/drawing/2014/main" id="{4792826F-499A-5F4E-9ABB-1B5B8BC45DC9}"/>
+          <p:cNvPr id="10" name="Slide Number Placeholder 9">
+            <a:extLst>
+              <a:ext uri="{FF2B5EF4-FFF2-40B4-BE49-F238E27FC236}">
+                <a16:creationId xmlns:a16="http://schemas.microsoft.com/office/drawing/2014/main" id="{15404D39-9C60-9C48-925F-B6030CEE25D9}"/>
               </a:ext>
             </a:extLst>
           </p:cNvPr>
@@ -330,6 +891,294 @@
 </file>
 
 <file path=ppt/slideLayouts/slideLayout10.xml><?xml version="1.0" encoding="utf-8"?>
+<p:sldLayout xmlns:a="http://schemas.openxmlformats.org/drawingml/2006/main" xmlns:r="http://schemas.openxmlformats.org/officeDocument/2006/relationships" xmlns:p="http://schemas.openxmlformats.org/presentationml/2006/main" type="picTx" preserve="1">
+  <p:cSld name="Picture with Caption">
+    <p:spTree>
+      <p:nvGrpSpPr>
+        <p:cNvPr id="1" name=""/>
+        <p:cNvGrpSpPr/>
+        <p:nvPr/>
+      </p:nvGrpSpPr>
+      <p:grpSpPr>
+        <a:xfrm>
+          <a:off x="0" y="0"/>
+          <a:ext cx="0" cy="0"/>
+          <a:chOff x="0" y="0"/>
+          <a:chExt cx="0" cy="0"/>
+        </a:xfrm>
+      </p:grpSpPr>
+      <p:sp>
+        <p:nvSpPr>
+          <p:cNvPr id="2" name="Title 1">
+            <a:extLst>
+              <a:ext uri="{FF2B5EF4-FFF2-40B4-BE49-F238E27FC236}">
+                <a16:creationId xmlns:a16="http://schemas.microsoft.com/office/drawing/2014/main" id="{FD7382FE-3200-894E-A761-8D2E01AF581A}"/>
+              </a:ext>
+            </a:extLst>
+          </p:cNvPr>
+          <p:cNvSpPr>
+            <a:spLocks noGrp="1"/>
+          </p:cNvSpPr>
+          <p:nvPr>
+            <p:ph type="title"/>
+          </p:nvPr>
+        </p:nvSpPr>
+        <p:spPr>
+          <a:xfrm>
+            <a:off x="839788" y="457200"/>
+            <a:ext cx="3932237" cy="1600200"/>
+          </a:xfrm>
+        </p:spPr>
+        <p:txBody>
+          <a:bodyPr anchor="b"/>
+          <a:lstStyle>
+            <a:lvl1pPr>
+              <a:defRPr sz="3200"/>
+            </a:lvl1pPr>
+          </a:lstStyle>
+          <a:p>
+            <a:r>
+              <a:rPr lang="en-US"/>
+              <a:t>Click to edit Master title style</a:t>
+            </a:r>
+          </a:p>
+        </p:txBody>
+      </p:sp>
+      <p:sp>
+        <p:nvSpPr>
+          <p:cNvPr id="3" name="Picture Placeholder 2">
+            <a:extLst>
+              <a:ext uri="{FF2B5EF4-FFF2-40B4-BE49-F238E27FC236}">
+                <a16:creationId xmlns:a16="http://schemas.microsoft.com/office/drawing/2014/main" id="{90792381-FC38-8C48-ACBB-AB82B0E60753}"/>
+              </a:ext>
+            </a:extLst>
+          </p:cNvPr>
+          <p:cNvSpPr>
+            <a:spLocks noGrp="1"/>
+          </p:cNvSpPr>
+          <p:nvPr>
+            <p:ph type="pic" idx="1"/>
+          </p:nvPr>
+        </p:nvSpPr>
+        <p:spPr>
+          <a:xfrm>
+            <a:off x="5183188" y="987425"/>
+            <a:ext cx="6172200" cy="4873625"/>
+          </a:xfrm>
+        </p:spPr>
+        <p:txBody>
+          <a:bodyPr/>
+          <a:lstStyle>
+            <a:lvl1pPr marL="0" indent="0">
+              <a:buNone/>
+              <a:defRPr sz="3200"/>
+            </a:lvl1pPr>
+            <a:lvl2pPr marL="457200" indent="0">
+              <a:buNone/>
+              <a:defRPr sz="2800"/>
+            </a:lvl2pPr>
+            <a:lvl3pPr marL="914400" indent="0">
+              <a:buNone/>
+              <a:defRPr sz="2400"/>
+            </a:lvl3pPr>
+            <a:lvl4pPr marL="1371600" indent="0">
+              <a:buNone/>
+              <a:defRPr sz="2000"/>
+            </a:lvl4pPr>
+            <a:lvl5pPr marL="1828800" indent="0">
+              <a:buNone/>
+              <a:defRPr sz="2000"/>
+            </a:lvl5pPr>
+            <a:lvl6pPr marL="2286000" indent="0">
+              <a:buNone/>
+              <a:defRPr sz="2000"/>
+            </a:lvl6pPr>
+            <a:lvl7pPr marL="2743200" indent="0">
+              <a:buNone/>
+              <a:defRPr sz="2000"/>
+            </a:lvl7pPr>
+            <a:lvl8pPr marL="3200400" indent="0">
+              <a:buNone/>
+              <a:defRPr sz="2000"/>
+            </a:lvl8pPr>
+            <a:lvl9pPr marL="3657600" indent="0">
+              <a:buNone/>
+              <a:defRPr sz="2000"/>
+            </a:lvl9pPr>
+          </a:lstStyle>
+          <a:p>
+            <a:endParaRPr lang="en-US"/>
+          </a:p>
+        </p:txBody>
+      </p:sp>
+      <p:sp>
+        <p:nvSpPr>
+          <p:cNvPr id="4" name="Text Placeholder 3">
+            <a:extLst>
+              <a:ext uri="{FF2B5EF4-FFF2-40B4-BE49-F238E27FC236}">
+                <a16:creationId xmlns:a16="http://schemas.microsoft.com/office/drawing/2014/main" id="{8F3E6136-68FB-204A-89EB-B89D703484A8}"/>
+              </a:ext>
+            </a:extLst>
+          </p:cNvPr>
+          <p:cNvSpPr>
+            <a:spLocks noGrp="1"/>
+          </p:cNvSpPr>
+          <p:nvPr>
+            <p:ph type="body" sz="half" idx="2"/>
+          </p:nvPr>
+        </p:nvSpPr>
+        <p:spPr>
+          <a:xfrm>
+            <a:off x="839788" y="2057400"/>
+            <a:ext cx="3932237" cy="3811588"/>
+          </a:xfrm>
+        </p:spPr>
+        <p:txBody>
+          <a:bodyPr/>
+          <a:lstStyle>
+            <a:lvl1pPr marL="0" indent="0">
+              <a:buNone/>
+              <a:defRPr sz="1600"/>
+            </a:lvl1pPr>
+            <a:lvl2pPr marL="457200" indent="0">
+              <a:buNone/>
+              <a:defRPr sz="1400"/>
+            </a:lvl2pPr>
+            <a:lvl3pPr marL="914400" indent="0">
+              <a:buNone/>
+              <a:defRPr sz="1200"/>
+            </a:lvl3pPr>
+            <a:lvl4pPr marL="1371600" indent="0">
+              <a:buNone/>
+              <a:defRPr sz="1000"/>
+            </a:lvl4pPr>
+            <a:lvl5pPr marL="1828800" indent="0">
+              <a:buNone/>
+              <a:defRPr sz="1000"/>
+            </a:lvl5pPr>
+            <a:lvl6pPr marL="2286000" indent="0">
+              <a:buNone/>
+              <a:defRPr sz="1000"/>
+            </a:lvl6pPr>
+            <a:lvl7pPr marL="2743200" indent="0">
+              <a:buNone/>
+              <a:defRPr sz="1000"/>
+            </a:lvl7pPr>
+            <a:lvl8pPr marL="3200400" indent="0">
+              <a:buNone/>
+              <a:defRPr sz="1000"/>
+            </a:lvl8pPr>
+            <a:lvl9pPr marL="3657600" indent="0">
+              <a:buNone/>
+              <a:defRPr sz="1000"/>
+            </a:lvl9pPr>
+          </a:lstStyle>
+          <a:p>
+            <a:pPr lvl="0"/>
+            <a:r>
+              <a:rPr lang="en-US"/>
+              <a:t>Click to edit Master text styles</a:t>
+            </a:r>
+          </a:p>
+        </p:txBody>
+      </p:sp>
+      <p:sp>
+        <p:nvSpPr>
+          <p:cNvPr id="5" name="Date Placeholder 4">
+            <a:extLst>
+              <a:ext uri="{FF2B5EF4-FFF2-40B4-BE49-F238E27FC236}">
+                <a16:creationId xmlns:a16="http://schemas.microsoft.com/office/drawing/2014/main" id="{99EBF1CD-29DF-B346-900B-CB468E2A9F23}"/>
+              </a:ext>
+            </a:extLst>
+          </p:cNvPr>
+          <p:cNvSpPr>
+            <a:spLocks noGrp="1"/>
+          </p:cNvSpPr>
+          <p:nvPr>
+            <p:ph type="dt" sz="half" idx="10"/>
+          </p:nvPr>
+        </p:nvSpPr>
+        <p:spPr/>
+        <p:txBody>
+          <a:bodyPr/>
+          <a:lstStyle/>
+          <a:p>
+            <a:fld id="{B1585002-4978-8F48-8E24-AE6B89E7A5A1}" type="datetimeFigureOut">
+              <a:rPr lang="en-US" smtClean="0"/>
+              <a:t>2/11/21</a:t>
+            </a:fld>
+            <a:endParaRPr lang="en-US"/>
+          </a:p>
+        </p:txBody>
+      </p:sp>
+      <p:sp>
+        <p:nvSpPr>
+          <p:cNvPr id="6" name="Footer Placeholder 5">
+            <a:extLst>
+              <a:ext uri="{FF2B5EF4-FFF2-40B4-BE49-F238E27FC236}">
+                <a16:creationId xmlns:a16="http://schemas.microsoft.com/office/drawing/2014/main" id="{C689EBE6-E75E-594D-93B4-7DEBBBB4739E}"/>
+              </a:ext>
+            </a:extLst>
+          </p:cNvPr>
+          <p:cNvSpPr>
+            <a:spLocks noGrp="1"/>
+          </p:cNvSpPr>
+          <p:nvPr>
+            <p:ph type="ftr" sz="quarter" idx="11"/>
+          </p:nvPr>
+        </p:nvSpPr>
+        <p:spPr/>
+        <p:txBody>
+          <a:bodyPr/>
+          <a:lstStyle/>
+          <a:p>
+            <a:endParaRPr lang="en-US"/>
+          </a:p>
+        </p:txBody>
+      </p:sp>
+      <p:sp>
+        <p:nvSpPr>
+          <p:cNvPr id="7" name="Slide Number Placeholder 6">
+            <a:extLst>
+              <a:ext uri="{FF2B5EF4-FFF2-40B4-BE49-F238E27FC236}">
+                <a16:creationId xmlns:a16="http://schemas.microsoft.com/office/drawing/2014/main" id="{1F981BDA-EF14-5D49-8E96-19C39F66F0C8}"/>
+              </a:ext>
+            </a:extLst>
+          </p:cNvPr>
+          <p:cNvSpPr>
+            <a:spLocks noGrp="1"/>
+          </p:cNvSpPr>
+          <p:nvPr>
+            <p:ph type="sldNum" sz="quarter" idx="12"/>
+          </p:nvPr>
+        </p:nvSpPr>
+        <p:spPr/>
+        <p:txBody>
+          <a:bodyPr/>
+          <a:lstStyle/>
+          <a:p>
+            <a:fld id="{49A464EC-C618-3E46-ADD0-3D6F3B9F58B7}" type="slidenum">
+              <a:rPr lang="en-US" smtClean="0"/>
+              <a:t>‹#›</a:t>
+            </a:fld>
+            <a:endParaRPr lang="en-US"/>
+          </a:p>
+        </p:txBody>
+      </p:sp>
+    </p:spTree>
+    <p:extLst>
+      <p:ext uri="{BB962C8B-B14F-4D97-AF65-F5344CB8AC3E}">
+        <p14:creationId xmlns:p14="http://schemas.microsoft.com/office/powerpoint/2010/main" val="2445988234"/>
+      </p:ext>
+    </p:extLst>
+  </p:cSld>
+  <p:clrMapOvr>
+    <a:masterClrMapping/>
+  </p:clrMapOvr>
+</p:sldLayout>
+</file>
+
+<file path=ppt/slideLayouts/slideLayout11.xml><?xml version="1.0" encoding="utf-8"?>
 <p:sldLayout xmlns:a="http://schemas.openxmlformats.org/drawingml/2006/main" xmlns:r="http://schemas.openxmlformats.org/officeDocument/2006/relationships" xmlns:p="http://schemas.openxmlformats.org/presentationml/2006/main" type="vertTx" preserve="1">
   <p:cSld name="Title and Vertical Text">
     <p:spTree>
@@ -454,7 +1303,7 @@
           <a:p>
             <a:fld id="{B1585002-4978-8F48-8E24-AE6B89E7A5A1}" type="datetimeFigureOut">
               <a:rPr lang="en-US" smtClean="0"/>
-              <a:t>2/10/21</a:t>
+              <a:t>2/11/21</a:t>
             </a:fld>
             <a:endParaRPr lang="en-US"/>
           </a:p>
@@ -527,7 +1376,7 @@
 </p:sldLayout>
 </file>
 
-<file path=ppt/slideLayouts/slideLayout11.xml><?xml version="1.0" encoding="utf-8"?>
+<file path=ppt/slideLayouts/slideLayout12.xml><?xml version="1.0" encoding="utf-8"?>
 <p:sldLayout xmlns:a="http://schemas.openxmlformats.org/drawingml/2006/main" xmlns:r="http://schemas.openxmlformats.org/officeDocument/2006/relationships" xmlns:p="http://schemas.openxmlformats.org/presentationml/2006/main" type="vertTitleAndTx" preserve="1">
   <p:cSld name="Vertical Title and Text">
     <p:spTree>
@@ -662,7 +1511,7 @@
           <a:p>
             <a:fld id="{B1585002-4978-8F48-8E24-AE6B89E7A5A1}" type="datetimeFigureOut">
               <a:rPr lang="en-US" smtClean="0"/>
-              <a:t>2/10/21</a:t>
+              <a:t>2/11/21</a:t>
             </a:fld>
             <a:endParaRPr lang="en-US"/>
           </a:p>
@@ -736,6 +1585,232 @@
 </file>
 
 <file path=ppt/slideLayouts/slideLayout2.xml><?xml version="1.0" encoding="utf-8"?>
+<p:sldLayout xmlns:a="http://schemas.openxmlformats.org/drawingml/2006/main" xmlns:r="http://schemas.openxmlformats.org/officeDocument/2006/relationships" xmlns:p="http://schemas.openxmlformats.org/presentationml/2006/main" preserve="1" userDrawn="1">
+  <p:cSld name="TC-Title">
+    <p:spTree>
+      <p:nvGrpSpPr>
+        <p:cNvPr id="1" name=""/>
+        <p:cNvGrpSpPr/>
+        <p:nvPr/>
+      </p:nvGrpSpPr>
+      <p:grpSpPr>
+        <a:xfrm>
+          <a:off x="0" y="0"/>
+          <a:ext cx="0" cy="0"/>
+          <a:chOff x="0" y="0"/>
+          <a:chExt cx="0" cy="0"/>
+        </a:xfrm>
+      </p:grpSpPr>
+      <p:sp>
+        <p:nvSpPr>
+          <p:cNvPr id="2" name="Title 1">
+            <a:extLst>
+              <a:ext uri="{FF2B5EF4-FFF2-40B4-BE49-F238E27FC236}">
+                <a16:creationId xmlns:a16="http://schemas.microsoft.com/office/drawing/2014/main" id="{2B875D77-12E7-7040-9475-5F3266D2B6B6}"/>
+              </a:ext>
+            </a:extLst>
+          </p:cNvPr>
+          <p:cNvSpPr>
+            <a:spLocks noGrp="1"/>
+          </p:cNvSpPr>
+          <p:nvPr>
+            <p:ph type="ctrTitle" hasCustomPrompt="1"/>
+          </p:nvPr>
+        </p:nvSpPr>
+        <p:spPr>
+          <a:xfrm>
+            <a:off x="1524000" y="1122363"/>
+            <a:ext cx="9144000" cy="2387600"/>
+          </a:xfrm>
+        </p:spPr>
+        <p:txBody>
+          <a:bodyPr anchor="b">
+            <a:noAutofit/>
+          </a:bodyPr>
+          <a:lstStyle>
+            <a:lvl1pPr algn="ctr">
+              <a:defRPr sz="8000" baseline="0">
+                <a:solidFill>
+                  <a:srgbClr val="FF0000"/>
+                </a:solidFill>
+              </a:defRPr>
+            </a:lvl1pPr>
+          </a:lstStyle>
+          <a:p>
+            <a:r>
+              <a:rPr lang="en-US" dirty="0"/>
+              <a:t>Tim Master title style</a:t>
+            </a:r>
+          </a:p>
+        </p:txBody>
+      </p:sp>
+      <p:sp>
+        <p:nvSpPr>
+          <p:cNvPr id="3" name="Subtitle 2">
+            <a:extLst>
+              <a:ext uri="{FF2B5EF4-FFF2-40B4-BE49-F238E27FC236}">
+                <a16:creationId xmlns:a16="http://schemas.microsoft.com/office/drawing/2014/main" id="{9A459D64-5D36-404A-A07E-D531D0E137B6}"/>
+              </a:ext>
+            </a:extLst>
+          </p:cNvPr>
+          <p:cNvSpPr>
+            <a:spLocks noGrp="1"/>
+          </p:cNvSpPr>
+          <p:nvPr>
+            <p:ph type="subTitle" idx="1" hasCustomPrompt="1"/>
+          </p:nvPr>
+        </p:nvSpPr>
+        <p:spPr>
+          <a:xfrm>
+            <a:off x="1524000" y="3602038"/>
+            <a:ext cx="9144000" cy="1655762"/>
+          </a:xfrm>
+        </p:spPr>
+        <p:txBody>
+          <a:bodyPr/>
+          <a:lstStyle>
+            <a:lvl1pPr marL="0" indent="0" algn="ctr">
+              <a:buNone/>
+              <a:defRPr sz="2400" i="1"/>
+            </a:lvl1pPr>
+            <a:lvl2pPr marL="457200" indent="0" algn="ctr">
+              <a:buNone/>
+              <a:defRPr sz="2000"/>
+            </a:lvl2pPr>
+            <a:lvl3pPr marL="914400" indent="0" algn="ctr">
+              <a:buNone/>
+              <a:defRPr sz="1800"/>
+            </a:lvl3pPr>
+            <a:lvl4pPr marL="1371600" indent="0" algn="ctr">
+              <a:buNone/>
+              <a:defRPr sz="1600"/>
+            </a:lvl4pPr>
+            <a:lvl5pPr marL="1828800" indent="0" algn="ctr">
+              <a:buNone/>
+              <a:defRPr sz="1600"/>
+            </a:lvl5pPr>
+            <a:lvl6pPr marL="2286000" indent="0" algn="ctr">
+              <a:buNone/>
+              <a:defRPr sz="1600"/>
+            </a:lvl6pPr>
+            <a:lvl7pPr marL="2743200" indent="0" algn="ctr">
+              <a:buNone/>
+              <a:defRPr sz="1600"/>
+            </a:lvl7pPr>
+            <a:lvl8pPr marL="3200400" indent="0" algn="ctr">
+              <a:buNone/>
+              <a:defRPr sz="1600"/>
+            </a:lvl8pPr>
+            <a:lvl9pPr marL="3657600" indent="0" algn="ctr">
+              <a:buNone/>
+              <a:defRPr sz="1600"/>
+            </a:lvl9pPr>
+          </a:lstStyle>
+          <a:p>
+            <a:r>
+              <a:rPr lang="en-US" dirty="0"/>
+              <a:t>Click to edit Tim Master subtitle style</a:t>
+            </a:r>
+          </a:p>
+        </p:txBody>
+      </p:sp>
+      <p:sp>
+        <p:nvSpPr>
+          <p:cNvPr id="4" name="Date Placeholder 3">
+            <a:extLst>
+              <a:ext uri="{FF2B5EF4-FFF2-40B4-BE49-F238E27FC236}">
+                <a16:creationId xmlns:a16="http://schemas.microsoft.com/office/drawing/2014/main" id="{5793339A-614C-D641-A01B-46D6CD94133E}"/>
+              </a:ext>
+            </a:extLst>
+          </p:cNvPr>
+          <p:cNvSpPr>
+            <a:spLocks noGrp="1"/>
+          </p:cNvSpPr>
+          <p:nvPr>
+            <p:ph type="dt" sz="half" idx="10"/>
+          </p:nvPr>
+        </p:nvSpPr>
+        <p:spPr/>
+        <p:txBody>
+          <a:bodyPr/>
+          <a:lstStyle/>
+          <a:p>
+            <a:fld id="{B1585002-4978-8F48-8E24-AE6B89E7A5A1}" type="datetimeFigureOut">
+              <a:rPr lang="en-US" smtClean="0"/>
+              <a:t>2/11/21</a:t>
+            </a:fld>
+            <a:endParaRPr lang="en-US"/>
+          </a:p>
+        </p:txBody>
+      </p:sp>
+      <p:sp>
+        <p:nvSpPr>
+          <p:cNvPr id="5" name="Footer Placeholder 4">
+            <a:extLst>
+              <a:ext uri="{FF2B5EF4-FFF2-40B4-BE49-F238E27FC236}">
+                <a16:creationId xmlns:a16="http://schemas.microsoft.com/office/drawing/2014/main" id="{85CF536D-137A-BC4A-9A21-10E9F1FC8743}"/>
+              </a:ext>
+            </a:extLst>
+          </p:cNvPr>
+          <p:cNvSpPr>
+            <a:spLocks noGrp="1"/>
+          </p:cNvSpPr>
+          <p:nvPr>
+            <p:ph type="ftr" sz="quarter" idx="11"/>
+          </p:nvPr>
+        </p:nvSpPr>
+        <p:spPr/>
+        <p:txBody>
+          <a:bodyPr/>
+          <a:lstStyle/>
+          <a:p>
+            <a:endParaRPr lang="en-US"/>
+          </a:p>
+        </p:txBody>
+      </p:sp>
+      <p:sp>
+        <p:nvSpPr>
+          <p:cNvPr id="6" name="Slide Number Placeholder 5">
+            <a:extLst>
+              <a:ext uri="{FF2B5EF4-FFF2-40B4-BE49-F238E27FC236}">
+                <a16:creationId xmlns:a16="http://schemas.microsoft.com/office/drawing/2014/main" id="{4792826F-499A-5F4E-9ABB-1B5B8BC45DC9}"/>
+              </a:ext>
+            </a:extLst>
+          </p:cNvPr>
+          <p:cNvSpPr>
+            <a:spLocks noGrp="1"/>
+          </p:cNvSpPr>
+          <p:nvPr>
+            <p:ph type="sldNum" sz="quarter" idx="12"/>
+          </p:nvPr>
+        </p:nvSpPr>
+        <p:spPr/>
+        <p:txBody>
+          <a:bodyPr/>
+          <a:lstStyle/>
+          <a:p>
+            <a:fld id="{49A464EC-C618-3E46-ADD0-3D6F3B9F58B7}" type="slidenum">
+              <a:rPr lang="en-US" smtClean="0"/>
+              <a:t>‹#›</a:t>
+            </a:fld>
+            <a:endParaRPr lang="en-US"/>
+          </a:p>
+        </p:txBody>
+      </p:sp>
+    </p:spTree>
+    <p:extLst>
+      <p:ext uri="{BB962C8B-B14F-4D97-AF65-F5344CB8AC3E}">
+        <p14:creationId xmlns:p14="http://schemas.microsoft.com/office/powerpoint/2010/main" val="3320461371"/>
+      </p:ext>
+    </p:extLst>
+  </p:cSld>
+  <p:clrMapOvr>
+    <a:masterClrMapping/>
+  </p:clrMapOvr>
+</p:sldLayout>
+</file>
+
+<file path=ppt/slideLayouts/slideLayout3.xml><?xml version="1.0" encoding="utf-8"?>
 <p:sldLayout xmlns:a="http://schemas.openxmlformats.org/drawingml/2006/main" xmlns:r="http://schemas.openxmlformats.org/officeDocument/2006/relationships" xmlns:p="http://schemas.openxmlformats.org/presentationml/2006/main" type="obj" preserve="1">
   <p:cSld name="Title and Content">
     <p:spTree>
@@ -803,35 +1878,35 @@
           <a:p>
             <a:pPr lvl="0"/>
             <a:r>
-              <a:rPr lang="en-US"/>
+              <a:rPr lang="en-US" dirty="0"/>
               <a:t>Click to edit Master text styles</a:t>
             </a:r>
           </a:p>
           <a:p>
             <a:pPr lvl="1"/>
             <a:r>
-              <a:rPr lang="en-US"/>
+              <a:rPr lang="en-US" dirty="0"/>
               <a:t>Second level</a:t>
             </a:r>
           </a:p>
           <a:p>
             <a:pPr lvl="2"/>
             <a:r>
-              <a:rPr lang="en-US"/>
+              <a:rPr lang="en-US" dirty="0"/>
               <a:t>Third level</a:t>
             </a:r>
           </a:p>
           <a:p>
             <a:pPr lvl="3"/>
             <a:r>
-              <a:rPr lang="en-US"/>
+              <a:rPr lang="en-US" dirty="0"/>
               <a:t>Fourth level</a:t>
             </a:r>
           </a:p>
           <a:p>
             <a:pPr lvl="4"/>
             <a:r>
-              <a:rPr lang="en-US"/>
+              <a:rPr lang="en-US" dirty="0"/>
               <a:t>Fifth level</a:t>
             </a:r>
           </a:p>
@@ -860,7 +1935,7 @@
           <a:p>
             <a:fld id="{B1585002-4978-8F48-8E24-AE6B89E7A5A1}" type="datetimeFigureOut">
               <a:rPr lang="en-US" smtClean="0"/>
-              <a:t>2/10/21</a:t>
+              <a:t>2/11/21</a:t>
             </a:fld>
             <a:endParaRPr lang="en-US"/>
           </a:p>
@@ -933,7 +2008,7 @@
 </p:sldLayout>
 </file>
 
-<file path=ppt/slideLayouts/slideLayout3.xml><?xml version="1.0" encoding="utf-8"?>
+<file path=ppt/slideLayouts/slideLayout4.xml><?xml version="1.0" encoding="utf-8"?>
 <p:sldLayout xmlns:a="http://schemas.openxmlformats.org/drawingml/2006/main" xmlns:r="http://schemas.openxmlformats.org/officeDocument/2006/relationships" xmlns:p="http://schemas.openxmlformats.org/presentationml/2006/main" type="secHead" preserve="1">
   <p:cSld name="Section Header">
     <p:spTree>
@@ -1135,7 +2210,7 @@
           <a:p>
             <a:fld id="{B1585002-4978-8F48-8E24-AE6B89E7A5A1}" type="datetimeFigureOut">
               <a:rPr lang="en-US" smtClean="0"/>
-              <a:t>2/10/21</a:t>
+              <a:t>2/11/21</a:t>
             </a:fld>
             <a:endParaRPr lang="en-US"/>
           </a:p>
@@ -1208,7 +2283,7 @@
 </p:sldLayout>
 </file>
 
-<file path=ppt/slideLayouts/slideLayout4.xml><?xml version="1.0" encoding="utf-8"?>
+<file path=ppt/slideLayouts/slideLayout5.xml><?xml version="1.0" encoding="utf-8"?>
 <p:sldLayout xmlns:a="http://schemas.openxmlformats.org/drawingml/2006/main" xmlns:r="http://schemas.openxmlformats.org/officeDocument/2006/relationships" xmlns:p="http://schemas.openxmlformats.org/presentationml/2006/main" type="twoObj" preserve="1">
   <p:cSld name="Two Content">
     <p:spTree>
@@ -1400,7 +2475,7 @@
           <a:p>
             <a:fld id="{B1585002-4978-8F48-8E24-AE6B89E7A5A1}" type="datetimeFigureOut">
               <a:rPr lang="en-US" smtClean="0"/>
-              <a:t>2/10/21</a:t>
+              <a:t>2/11/21</a:t>
             </a:fld>
             <a:endParaRPr lang="en-US"/>
           </a:p>
@@ -1473,7 +2548,7 @@
 </p:sldLayout>
 </file>
 
-<file path=ppt/slideLayouts/slideLayout5.xml><?xml version="1.0" encoding="utf-8"?>
+<file path=ppt/slideLayouts/slideLayout6.xml><?xml version="1.0" encoding="utf-8"?>
 <p:sldLayout xmlns:a="http://schemas.openxmlformats.org/drawingml/2006/main" xmlns:r="http://schemas.openxmlformats.org/officeDocument/2006/relationships" xmlns:p="http://schemas.openxmlformats.org/presentationml/2006/main" type="twoTxTwoObj" preserve="1">
   <p:cSld name="Comparison">
     <p:spTree>
@@ -1812,7 +2887,7 @@
           <a:p>
             <a:fld id="{B1585002-4978-8F48-8E24-AE6B89E7A5A1}" type="datetimeFigureOut">
               <a:rPr lang="en-US" smtClean="0"/>
-              <a:t>2/10/21</a:t>
+              <a:t>2/11/21</a:t>
             </a:fld>
             <a:endParaRPr lang="en-US"/>
           </a:p>
@@ -1885,7 +2960,7 @@
 </p:sldLayout>
 </file>
 
-<file path=ppt/slideLayouts/slideLayout6.xml><?xml version="1.0" encoding="utf-8"?>
+<file path=ppt/slideLayouts/slideLayout7.xml><?xml version="1.0" encoding="utf-8"?>
 <p:sldLayout xmlns:a="http://schemas.openxmlformats.org/drawingml/2006/main" xmlns:r="http://schemas.openxmlformats.org/officeDocument/2006/relationships" xmlns:p="http://schemas.openxmlformats.org/presentationml/2006/main" type="titleOnly" preserve="1">
   <p:cSld name="Title Only">
     <p:spTree>
@@ -1953,7 +3028,7 @@
           <a:p>
             <a:fld id="{B1585002-4978-8F48-8E24-AE6B89E7A5A1}" type="datetimeFigureOut">
               <a:rPr lang="en-US" smtClean="0"/>
-              <a:t>2/10/21</a:t>
+              <a:t>2/11/21</a:t>
             </a:fld>
             <a:endParaRPr lang="en-US"/>
           </a:p>
@@ -2026,7 +3101,7 @@
 </p:sldLayout>
 </file>
 
-<file path=ppt/slideLayouts/slideLayout7.xml><?xml version="1.0" encoding="utf-8"?>
+<file path=ppt/slideLayouts/slideLayout8.xml><?xml version="1.0" encoding="utf-8"?>
 <p:sldLayout xmlns:a="http://schemas.openxmlformats.org/drawingml/2006/main" xmlns:r="http://schemas.openxmlformats.org/officeDocument/2006/relationships" xmlns:p="http://schemas.openxmlformats.org/presentationml/2006/main" type="blank" preserve="1">
   <p:cSld name="Blank">
     <p:spTree>
@@ -2066,7 +3141,7 @@
           <a:p>
             <a:fld id="{B1585002-4978-8F48-8E24-AE6B89E7A5A1}" type="datetimeFigureOut">
               <a:rPr lang="en-US" smtClean="0"/>
-              <a:t>2/10/21</a:t>
+              <a:t>2/11/21</a:t>
             </a:fld>
             <a:endParaRPr lang="en-US"/>
           </a:p>
@@ -2139,7 +3214,7 @@
 </p:sldLayout>
 </file>
 
-<file path=ppt/slideLayouts/slideLayout8.xml><?xml version="1.0" encoding="utf-8"?>
+<file path=ppt/slideLayouts/slideLayout9.xml><?xml version="1.0" encoding="utf-8"?>
 <p:sldLayout xmlns:a="http://schemas.openxmlformats.org/drawingml/2006/main" xmlns:r="http://schemas.openxmlformats.org/officeDocument/2006/relationships" xmlns:p="http://schemas.openxmlformats.org/presentationml/2006/main" type="objTx" preserve="1">
   <p:cSld name="Content with Caption">
     <p:spTree>
@@ -2377,7 +3452,7 @@
           <a:p>
             <a:fld id="{B1585002-4978-8F48-8E24-AE6B89E7A5A1}" type="datetimeFigureOut">
               <a:rPr lang="en-US" smtClean="0"/>
-              <a:t>2/10/21</a:t>
+              <a:t>2/11/21</a:t>
             </a:fld>
             <a:endParaRPr lang="en-US"/>
           </a:p>
@@ -2441,294 +3516,6 @@
     <p:extLst>
       <p:ext uri="{BB962C8B-B14F-4D97-AF65-F5344CB8AC3E}">
         <p14:creationId xmlns:p14="http://schemas.microsoft.com/office/powerpoint/2010/main" val="705201008"/>
-      </p:ext>
-    </p:extLst>
-  </p:cSld>
-  <p:clrMapOvr>
-    <a:masterClrMapping/>
-  </p:clrMapOvr>
-</p:sldLayout>
-</file>
-
-<file path=ppt/slideLayouts/slideLayout9.xml><?xml version="1.0" encoding="utf-8"?>
-<p:sldLayout xmlns:a="http://schemas.openxmlformats.org/drawingml/2006/main" xmlns:r="http://schemas.openxmlformats.org/officeDocument/2006/relationships" xmlns:p="http://schemas.openxmlformats.org/presentationml/2006/main" type="picTx" preserve="1">
-  <p:cSld name="Picture with Caption">
-    <p:spTree>
-      <p:nvGrpSpPr>
-        <p:cNvPr id="1" name=""/>
-        <p:cNvGrpSpPr/>
-        <p:nvPr/>
-      </p:nvGrpSpPr>
-      <p:grpSpPr>
-        <a:xfrm>
-          <a:off x="0" y="0"/>
-          <a:ext cx="0" cy="0"/>
-          <a:chOff x="0" y="0"/>
-          <a:chExt cx="0" cy="0"/>
-        </a:xfrm>
-      </p:grpSpPr>
-      <p:sp>
-        <p:nvSpPr>
-          <p:cNvPr id="2" name="Title 1">
-            <a:extLst>
-              <a:ext uri="{FF2B5EF4-FFF2-40B4-BE49-F238E27FC236}">
-                <a16:creationId xmlns:a16="http://schemas.microsoft.com/office/drawing/2014/main" id="{FD7382FE-3200-894E-A761-8D2E01AF581A}"/>
-              </a:ext>
-            </a:extLst>
-          </p:cNvPr>
-          <p:cNvSpPr>
-            <a:spLocks noGrp="1"/>
-          </p:cNvSpPr>
-          <p:nvPr>
-            <p:ph type="title"/>
-          </p:nvPr>
-        </p:nvSpPr>
-        <p:spPr>
-          <a:xfrm>
-            <a:off x="839788" y="457200"/>
-            <a:ext cx="3932237" cy="1600200"/>
-          </a:xfrm>
-        </p:spPr>
-        <p:txBody>
-          <a:bodyPr anchor="b"/>
-          <a:lstStyle>
-            <a:lvl1pPr>
-              <a:defRPr sz="3200"/>
-            </a:lvl1pPr>
-          </a:lstStyle>
-          <a:p>
-            <a:r>
-              <a:rPr lang="en-US"/>
-              <a:t>Click to edit Master title style</a:t>
-            </a:r>
-          </a:p>
-        </p:txBody>
-      </p:sp>
-      <p:sp>
-        <p:nvSpPr>
-          <p:cNvPr id="3" name="Picture Placeholder 2">
-            <a:extLst>
-              <a:ext uri="{FF2B5EF4-FFF2-40B4-BE49-F238E27FC236}">
-                <a16:creationId xmlns:a16="http://schemas.microsoft.com/office/drawing/2014/main" id="{90792381-FC38-8C48-ACBB-AB82B0E60753}"/>
-              </a:ext>
-            </a:extLst>
-          </p:cNvPr>
-          <p:cNvSpPr>
-            <a:spLocks noGrp="1"/>
-          </p:cNvSpPr>
-          <p:nvPr>
-            <p:ph type="pic" idx="1"/>
-          </p:nvPr>
-        </p:nvSpPr>
-        <p:spPr>
-          <a:xfrm>
-            <a:off x="5183188" y="987425"/>
-            <a:ext cx="6172200" cy="4873625"/>
-          </a:xfrm>
-        </p:spPr>
-        <p:txBody>
-          <a:bodyPr/>
-          <a:lstStyle>
-            <a:lvl1pPr marL="0" indent="0">
-              <a:buNone/>
-              <a:defRPr sz="3200"/>
-            </a:lvl1pPr>
-            <a:lvl2pPr marL="457200" indent="0">
-              <a:buNone/>
-              <a:defRPr sz="2800"/>
-            </a:lvl2pPr>
-            <a:lvl3pPr marL="914400" indent="0">
-              <a:buNone/>
-              <a:defRPr sz="2400"/>
-            </a:lvl3pPr>
-            <a:lvl4pPr marL="1371600" indent="0">
-              <a:buNone/>
-              <a:defRPr sz="2000"/>
-            </a:lvl4pPr>
-            <a:lvl5pPr marL="1828800" indent="0">
-              <a:buNone/>
-              <a:defRPr sz="2000"/>
-            </a:lvl5pPr>
-            <a:lvl6pPr marL="2286000" indent="0">
-              <a:buNone/>
-              <a:defRPr sz="2000"/>
-            </a:lvl6pPr>
-            <a:lvl7pPr marL="2743200" indent="0">
-              <a:buNone/>
-              <a:defRPr sz="2000"/>
-            </a:lvl7pPr>
-            <a:lvl8pPr marL="3200400" indent="0">
-              <a:buNone/>
-              <a:defRPr sz="2000"/>
-            </a:lvl8pPr>
-            <a:lvl9pPr marL="3657600" indent="0">
-              <a:buNone/>
-              <a:defRPr sz="2000"/>
-            </a:lvl9pPr>
-          </a:lstStyle>
-          <a:p>
-            <a:endParaRPr lang="en-US"/>
-          </a:p>
-        </p:txBody>
-      </p:sp>
-      <p:sp>
-        <p:nvSpPr>
-          <p:cNvPr id="4" name="Text Placeholder 3">
-            <a:extLst>
-              <a:ext uri="{FF2B5EF4-FFF2-40B4-BE49-F238E27FC236}">
-                <a16:creationId xmlns:a16="http://schemas.microsoft.com/office/drawing/2014/main" id="{8F3E6136-68FB-204A-89EB-B89D703484A8}"/>
-              </a:ext>
-            </a:extLst>
-          </p:cNvPr>
-          <p:cNvSpPr>
-            <a:spLocks noGrp="1"/>
-          </p:cNvSpPr>
-          <p:nvPr>
-            <p:ph type="body" sz="half" idx="2"/>
-          </p:nvPr>
-        </p:nvSpPr>
-        <p:spPr>
-          <a:xfrm>
-            <a:off x="839788" y="2057400"/>
-            <a:ext cx="3932237" cy="3811588"/>
-          </a:xfrm>
-        </p:spPr>
-        <p:txBody>
-          <a:bodyPr/>
-          <a:lstStyle>
-            <a:lvl1pPr marL="0" indent="0">
-              <a:buNone/>
-              <a:defRPr sz="1600"/>
-            </a:lvl1pPr>
-            <a:lvl2pPr marL="457200" indent="0">
-              <a:buNone/>
-              <a:defRPr sz="1400"/>
-            </a:lvl2pPr>
-            <a:lvl3pPr marL="914400" indent="0">
-              <a:buNone/>
-              <a:defRPr sz="1200"/>
-            </a:lvl3pPr>
-            <a:lvl4pPr marL="1371600" indent="0">
-              <a:buNone/>
-              <a:defRPr sz="1000"/>
-            </a:lvl4pPr>
-            <a:lvl5pPr marL="1828800" indent="0">
-              <a:buNone/>
-              <a:defRPr sz="1000"/>
-            </a:lvl5pPr>
-            <a:lvl6pPr marL="2286000" indent="0">
-              <a:buNone/>
-              <a:defRPr sz="1000"/>
-            </a:lvl6pPr>
-            <a:lvl7pPr marL="2743200" indent="0">
-              <a:buNone/>
-              <a:defRPr sz="1000"/>
-            </a:lvl7pPr>
-            <a:lvl8pPr marL="3200400" indent="0">
-              <a:buNone/>
-              <a:defRPr sz="1000"/>
-            </a:lvl8pPr>
-            <a:lvl9pPr marL="3657600" indent="0">
-              <a:buNone/>
-              <a:defRPr sz="1000"/>
-            </a:lvl9pPr>
-          </a:lstStyle>
-          <a:p>
-            <a:pPr lvl="0"/>
-            <a:r>
-              <a:rPr lang="en-US"/>
-              <a:t>Click to edit Master text styles</a:t>
-            </a:r>
-          </a:p>
-        </p:txBody>
-      </p:sp>
-      <p:sp>
-        <p:nvSpPr>
-          <p:cNvPr id="5" name="Date Placeholder 4">
-            <a:extLst>
-              <a:ext uri="{FF2B5EF4-FFF2-40B4-BE49-F238E27FC236}">
-                <a16:creationId xmlns:a16="http://schemas.microsoft.com/office/drawing/2014/main" id="{99EBF1CD-29DF-B346-900B-CB468E2A9F23}"/>
-              </a:ext>
-            </a:extLst>
-          </p:cNvPr>
-          <p:cNvSpPr>
-            <a:spLocks noGrp="1"/>
-          </p:cNvSpPr>
-          <p:nvPr>
-            <p:ph type="dt" sz="half" idx="10"/>
-          </p:nvPr>
-        </p:nvSpPr>
-        <p:spPr/>
-        <p:txBody>
-          <a:bodyPr/>
-          <a:lstStyle/>
-          <a:p>
-            <a:fld id="{B1585002-4978-8F48-8E24-AE6B89E7A5A1}" type="datetimeFigureOut">
-              <a:rPr lang="en-US" smtClean="0"/>
-              <a:t>2/10/21</a:t>
-            </a:fld>
-            <a:endParaRPr lang="en-US"/>
-          </a:p>
-        </p:txBody>
-      </p:sp>
-      <p:sp>
-        <p:nvSpPr>
-          <p:cNvPr id="6" name="Footer Placeholder 5">
-            <a:extLst>
-              <a:ext uri="{FF2B5EF4-FFF2-40B4-BE49-F238E27FC236}">
-                <a16:creationId xmlns:a16="http://schemas.microsoft.com/office/drawing/2014/main" id="{C689EBE6-E75E-594D-93B4-7DEBBBB4739E}"/>
-              </a:ext>
-            </a:extLst>
-          </p:cNvPr>
-          <p:cNvSpPr>
-            <a:spLocks noGrp="1"/>
-          </p:cNvSpPr>
-          <p:nvPr>
-            <p:ph type="ftr" sz="quarter" idx="11"/>
-          </p:nvPr>
-        </p:nvSpPr>
-        <p:spPr/>
-        <p:txBody>
-          <a:bodyPr/>
-          <a:lstStyle/>
-          <a:p>
-            <a:endParaRPr lang="en-US"/>
-          </a:p>
-        </p:txBody>
-      </p:sp>
-      <p:sp>
-        <p:nvSpPr>
-          <p:cNvPr id="7" name="Slide Number Placeholder 6">
-            <a:extLst>
-              <a:ext uri="{FF2B5EF4-FFF2-40B4-BE49-F238E27FC236}">
-                <a16:creationId xmlns:a16="http://schemas.microsoft.com/office/drawing/2014/main" id="{1F981BDA-EF14-5D49-8E96-19C39F66F0C8}"/>
-              </a:ext>
-            </a:extLst>
-          </p:cNvPr>
-          <p:cNvSpPr>
-            <a:spLocks noGrp="1"/>
-          </p:cNvSpPr>
-          <p:nvPr>
-            <p:ph type="sldNum" sz="quarter" idx="12"/>
-          </p:nvPr>
-        </p:nvSpPr>
-        <p:spPr/>
-        <p:txBody>
-          <a:bodyPr/>
-          <a:lstStyle/>
-          <a:p>
-            <a:fld id="{49A464EC-C618-3E46-ADD0-3D6F3B9F58B7}" type="slidenum">
-              <a:rPr lang="en-US" smtClean="0"/>
-              <a:t>‹#›</a:t>
-            </a:fld>
-            <a:endParaRPr lang="en-US"/>
-          </a:p>
-        </p:txBody>
-      </p:sp>
-    </p:spTree>
-    <p:extLst>
-      <p:ext uri="{BB962C8B-B14F-4D97-AF65-F5344CB8AC3E}">
-        <p14:creationId xmlns:p14="http://schemas.microsoft.com/office/powerpoint/2010/main" val="2445988234"/>
       </p:ext>
     </p:extLst>
   </p:cSld>
@@ -2906,7 +3693,7 @@
           <a:p>
             <a:fld id="{B1585002-4978-8F48-8E24-AE6B89E7A5A1}" type="datetimeFigureOut">
               <a:rPr lang="en-US" smtClean="0"/>
-              <a:t>2/10/21</a:t>
+              <a:t>2/11/21</a:t>
             </a:fld>
             <a:endParaRPr lang="en-US"/>
           </a:p>
@@ -3012,16 +3799,17 @@
   <p:clrMap bg1="lt1" tx1="dk1" bg2="lt2" tx2="dk2" accent1="accent1" accent2="accent2" accent3="accent3" accent4="accent4" accent5="accent5" accent6="accent6" hlink="hlink" folHlink="folHlink"/>
   <p:sldLayoutIdLst>
     <p:sldLayoutId id="2147483649" r:id="rId1"/>
-    <p:sldLayoutId id="2147483650" r:id="rId2"/>
-    <p:sldLayoutId id="2147483651" r:id="rId3"/>
-    <p:sldLayoutId id="2147483652" r:id="rId4"/>
-    <p:sldLayoutId id="2147483653" r:id="rId5"/>
-    <p:sldLayoutId id="2147483654" r:id="rId6"/>
-    <p:sldLayoutId id="2147483655" r:id="rId7"/>
-    <p:sldLayoutId id="2147483656" r:id="rId8"/>
-    <p:sldLayoutId id="2147483657" r:id="rId9"/>
-    <p:sldLayoutId id="2147483658" r:id="rId10"/>
-    <p:sldLayoutId id="2147483659" r:id="rId11"/>
+    <p:sldLayoutId id="2147483660" r:id="rId2"/>
+    <p:sldLayoutId id="2147483650" r:id="rId3"/>
+    <p:sldLayoutId id="2147483651" r:id="rId4"/>
+    <p:sldLayoutId id="2147483652" r:id="rId5"/>
+    <p:sldLayoutId id="2147483653" r:id="rId6"/>
+    <p:sldLayoutId id="2147483654" r:id="rId7"/>
+    <p:sldLayoutId id="2147483655" r:id="rId8"/>
+    <p:sldLayoutId id="2147483656" r:id="rId9"/>
+    <p:sldLayoutId id="2147483657" r:id="rId10"/>
+    <p:sldLayoutId id="2147483658" r:id="rId11"/>
+    <p:sldLayoutId id="2147483659" r:id="rId12"/>
   </p:sldLayoutIdLst>
   <p:txStyles>
     <p:titleStyle>
@@ -3339,7 +4127,12 @@
             <p:ph type="ctrTitle"/>
           </p:nvPr>
         </p:nvSpPr>
-        <p:spPr/>
+        <p:spPr>
+          <a:xfrm>
+            <a:off x="1524000" y="1122363"/>
+            <a:ext cx="9144000" cy="2387600"/>
+          </a:xfrm>
+        </p:spPr>
         <p:txBody>
           <a:bodyPr/>
           <a:lstStyle/>
@@ -3479,6 +4272,91 @@
           </a:p>
         </p:txBody>
       </p:sp>
+      <p:pic>
+        <p:nvPicPr>
+          <p:cNvPr id="11" name="Graphic 10" descr="Voice with solid fill">
+            <a:extLst>
+              <a:ext uri="{FF2B5EF4-FFF2-40B4-BE49-F238E27FC236}">
+                <a16:creationId xmlns:a16="http://schemas.microsoft.com/office/drawing/2014/main" id="{E5213559-BFD6-1F42-BF60-DB9BCF992135}"/>
+              </a:ext>
+            </a:extLst>
+          </p:cNvPr>
+          <p:cNvPicPr>
+            <a:picLocks noChangeAspect="1"/>
+          </p:cNvPicPr>
+          <p:nvPr/>
+        </p:nvPicPr>
+        <p:blipFill>
+          <a:blip r:embed="rId4">
+            <a:extLst>
+              <a:ext uri="{96DAC541-7B7A-43D3-8B79-37D633B846F1}">
+                <asvg:svgBlip xmlns:asvg="http://schemas.microsoft.com/office/drawing/2016/SVG/main" r:embed="rId5"/>
+              </a:ext>
+            </a:extLst>
+          </a:blip>
+          <a:stretch>
+            <a:fillRect/>
+          </a:stretch>
+        </p:blipFill>
+        <p:spPr>
+          <a:xfrm>
+            <a:off x="7468800" y="1690688"/>
+            <a:ext cx="3714750" cy="3714750"/>
+          </a:xfrm>
+          <a:prstGeom prst="rect">
+            <a:avLst/>
+          </a:prstGeom>
+        </p:spPr>
+      </p:pic>
+      <p:pic>
+        <p:nvPicPr>
+          <p:cNvPr id="6" name="sample-audio" descr="sample-audio">
+            <a:hlinkClick r:id="" action="ppaction://media"/>
+            <a:extLst>
+              <a:ext uri="{FF2B5EF4-FFF2-40B4-BE49-F238E27FC236}">
+                <a16:creationId xmlns:a16="http://schemas.microsoft.com/office/drawing/2014/main" id="{2A839A2C-68A7-3348-B7D8-C2DE1377EB0F}"/>
+              </a:ext>
+            </a:extLst>
+          </p:cNvPr>
+          <p:cNvPicPr>
+            <a:picLocks noChangeAspect="1"/>
+          </p:cNvPicPr>
+          <p:nvPr>
+            <a:audioFile r:link="rId2"/>
+            <p:extLst>
+              <p:ext uri="{DAA4B4D4-6D71-4841-9C94-3DE7FCFB9230}">
+                <p14:media xmlns:p14="http://schemas.microsoft.com/office/powerpoint/2010/main" r:embed="rId1"/>
+              </p:ext>
+            </p:extLst>
+          </p:nvPr>
+        </p:nvPicPr>
+        <p:blipFill>
+          <a:blip r:embed="rId6"/>
+          <a:stretch>
+            <a:fillRect/>
+          </a:stretch>
+        </p:blipFill>
+        <p:spPr>
+          <a:xfrm>
+            <a:off x="4927600" y="2744788"/>
+            <a:ext cx="1606550" cy="1606550"/>
+          </a:xfrm>
+          <a:prstGeom prst="rect">
+            <a:avLst/>
+          </a:prstGeom>
+          <a:solidFill>
+            <a:schemeClr val="accent1"/>
+          </a:solidFill>
+          <a:effectLst>
+            <a:glow rad="228600">
+              <a:schemeClr val="accent5">
+                <a:satMod val="175000"/>
+                <a:alpha val="40000"/>
+              </a:schemeClr>
+            </a:glow>
+          </a:effectLst>
+        </p:spPr>
+      </p:pic>
     </p:spTree>
     <p:extLst>
       <p:ext uri="{BB962C8B-B14F-4D97-AF65-F5344CB8AC3E}">
@@ -3489,12 +4367,96 @@
   <p:clrMapOvr>
     <a:masterClrMapping/>
   </p:clrMapOvr>
+  <p:timing>
+    <p:tnLst>
+      <p:par>
+        <p:cTn id="1" dur="indefinite" restart="never" nodeType="tmRoot">
+          <p:childTnLst>
+            <p:seq concurrent="1" nextAc="seek">
+              <p:cTn id="2" dur="indefinite" nodeType="mainSeq">
+                <p:childTnLst>
+                  <p:par>
+                    <p:cTn id="3" fill="hold">
+                      <p:stCondLst>
+                        <p:cond delay="indefinite"/>
+                      </p:stCondLst>
+                      <p:childTnLst>
+                        <p:par>
+                          <p:cTn id="4" fill="hold">
+                            <p:stCondLst>
+                              <p:cond delay="0"/>
+                            </p:stCondLst>
+                            <p:childTnLst>
+                              <p:par>
+                                <p:cTn id="5" presetID="1" presetClass="mediacall" presetSubtype="0" fill="hold" nodeType="clickEffect">
+                                  <p:stCondLst>
+                                    <p:cond delay="0"/>
+                                  </p:stCondLst>
+                                  <p:childTnLst>
+                                    <p:cmd type="call" cmd="playFrom(0.0)">
+                                      <p:cBhvr>
+                                        <p:cTn id="6" dur="3604" fill="hold"/>
+                                        <p:tgtEl>
+                                          <p:spTgt spid="6"/>
+                                        </p:tgtEl>
+                                      </p:cBhvr>
+                                    </p:cmd>
+                                  </p:childTnLst>
+                                </p:cTn>
+                              </p:par>
+                            </p:childTnLst>
+                          </p:cTn>
+                        </p:par>
+                      </p:childTnLst>
+                    </p:cTn>
+                  </p:par>
+                </p:childTnLst>
+              </p:cTn>
+              <p:prevCondLst>
+                <p:cond evt="onPrev" delay="0">
+                  <p:tgtEl>
+                    <p:sldTgt/>
+                  </p:tgtEl>
+                </p:cond>
+              </p:prevCondLst>
+              <p:nextCondLst>
+                <p:cond evt="onNext" delay="0">
+                  <p:tgtEl>
+                    <p:sldTgt/>
+                  </p:tgtEl>
+                </p:cond>
+              </p:nextCondLst>
+            </p:seq>
+            <p:audio>
+              <p:cMediaNode vol="80000">
+                <p:cTn id="7" fill="hold" display="0">
+                  <p:stCondLst>
+                    <p:cond delay="indefinite"/>
+                  </p:stCondLst>
+                  <p:endCondLst>
+                    <p:cond evt="onStopAudio" delay="0">
+                      <p:tgtEl>
+                        <p:sldTgt/>
+                      </p:tgtEl>
+                    </p:cond>
+                  </p:endCondLst>
+                </p:cTn>
+                <p:tgtEl>
+                  <p:spTgt spid="6"/>
+                </p:tgtEl>
+              </p:cMediaNode>
+            </p:audio>
+          </p:childTnLst>
+        </p:cTn>
+      </p:par>
+    </p:tnLst>
+  </p:timing>
 </p:sld>
 </file>
 
 <file path=ppt/slides/slide3.xml><?xml version="1.0" encoding="utf-8"?>
 <p:sld xmlns:a="http://schemas.openxmlformats.org/drawingml/2006/main" xmlns:r="http://schemas.openxmlformats.org/officeDocument/2006/relationships" xmlns:p="http://schemas.openxmlformats.org/presentationml/2006/main">
-  <p:cSld>
+  <p:cSld name="cSld-name-9C3C9787-305F-4251-9A7D-2B0E5B0DC7E6">
     <p:spTree>
       <p:nvGrpSpPr>
         <p:cNvPr id="1" name=""/>
@@ -3531,9 +4493,10 @@
           <a:lstStyle/>
           <a:p>
             <a:r>
-              <a:rPr lang="en-US" dirty="0"/>
+              <a:rPr lang="en-US"/>
               <a:t>Originally Slide #3</a:t>
             </a:r>
+            <a:endParaRPr lang="en-US" dirty="0"/>
           </a:p>
         </p:txBody>
       </p:sp>
@@ -3553,23 +4516,87 @@
             <p:ph idx="1"/>
           </p:nvPr>
         </p:nvSpPr>
-        <p:spPr/>
-        <p:txBody>
-          <a:bodyPr/>
-          <a:lstStyle/>
-          <a:p>
-            <a:r>
-              <a:rPr lang="en-US" dirty="0"/>
-              <a:t>Bullets </a:t>
-            </a:r>
-            <a:r>
-              <a:rPr lang="en-US"/>
-              <a:t>on Slide #3</a:t>
+        <p:spPr>
+          <a:xfrm>
+            <a:off x="838200" y="1825625"/>
+            <a:ext cx="4715107" cy="4351338"/>
+          </a:xfrm>
+        </p:spPr>
+        <p:txBody>
+          <a:bodyPr/>
+          <a:lstStyle/>
+          <a:p>
+            <a:r>
+              <a:rPr lang="en-US"/>
+              <a:t>Bullets on Slide #3</a:t>
+            </a:r>
+          </a:p>
+          <a:p>
+            <a:r>
+              <a:rPr lang="en-US"/>
+              <a:t>Slide has a unique name, embedded into the XML</a:t>
+            </a:r>
+          </a:p>
+          <a:p>
+            <a:r>
+              <a:rPr lang="en-US"/>
+              <a:t>In PPT on Windows, name can be viewed/edited via the Developer tab. </a:t>
+            </a:r>
+          </a:p>
+          <a:p>
+            <a:pPr lvl="1"/>
+            <a:r>
+              <a:rPr lang="en-US"/>
+              <a:t>Add a control to the slide.</a:t>
+            </a:r>
+          </a:p>
+          <a:p>
+            <a:pPr lvl="1"/>
+            <a:r>
+              <a:rPr lang="en-US"/>
+              <a:t>Open Properties of the control</a:t>
+            </a:r>
+          </a:p>
+          <a:p>
+            <a:pPr lvl="1"/>
+            <a:r>
+              <a:rPr lang="en-US"/>
+              <a:t>Select the Slide from the drop-down of elements</a:t>
             </a:r>
             <a:endParaRPr lang="en-US" dirty="0"/>
           </a:p>
         </p:txBody>
       </p:sp>
+      <p:pic>
+        <p:nvPicPr>
+          <p:cNvPr id="9" name="Picture 8" descr="A group of colored pencils&#10;&#10;Description automatically generated with medium confidence">
+            <a:extLst>
+              <a:ext uri="{FF2B5EF4-FFF2-40B4-BE49-F238E27FC236}">
+                <a16:creationId xmlns:a16="http://schemas.microsoft.com/office/drawing/2014/main" id="{F48D7C4D-7251-8946-9FCE-0282975F0EFB}"/>
+              </a:ext>
+            </a:extLst>
+          </p:cNvPr>
+          <p:cNvPicPr>
+            <a:picLocks noChangeAspect="1"/>
+          </p:cNvPicPr>
+          <p:nvPr/>
+        </p:nvPicPr>
+        <p:blipFill>
+          <a:blip r:embed="rId2"/>
+          <a:stretch>
+            <a:fillRect/>
+          </a:stretch>
+        </p:blipFill>
+        <p:spPr>
+          <a:xfrm>
+            <a:off x="6638695" y="2197100"/>
+            <a:ext cx="3695700" cy="2463800"/>
+          </a:xfrm>
+          <a:prstGeom prst="rect">
+            <a:avLst/>
+          </a:prstGeom>
+        </p:spPr>
+      </p:pic>
     </p:spTree>
     <p:extLst>
       <p:ext uri="{BB962C8B-B14F-4D97-AF65-F5344CB8AC3E}">
@@ -3876,4 +4903,594 @@
     </a:ext>
   </a:extLst>
 </a:theme>
+</file>
+
+<file path=ppt/theme/theme2.xml><?xml version="1.0" encoding="utf-8"?>
+<a:theme xmlns:a="http://schemas.openxmlformats.org/drawingml/2006/main" name="Office Theme">
+  <a:themeElements>
+    <a:clrScheme name="Office">
+      <a:dk1>
+        <a:sysClr val="windowText" lastClr="000000"/>
+      </a:dk1>
+      <a:lt1>
+        <a:sysClr val="window" lastClr="FFFFFF"/>
+      </a:lt1>
+      <a:dk2>
+        <a:srgbClr val="44546A"/>
+      </a:dk2>
+      <a:lt2>
+        <a:srgbClr val="E7E6E6"/>
+      </a:lt2>
+      <a:accent1>
+        <a:srgbClr val="4472C4"/>
+      </a:accent1>
+      <a:accent2>
+        <a:srgbClr val="ED7D31"/>
+      </a:accent2>
+      <a:accent3>
+        <a:srgbClr val="A5A5A5"/>
+      </a:accent3>
+      <a:accent4>
+        <a:srgbClr val="FFC000"/>
+      </a:accent4>
+      <a:accent5>
+        <a:srgbClr val="5B9BD5"/>
+      </a:accent5>
+      <a:accent6>
+        <a:srgbClr val="70AD47"/>
+      </a:accent6>
+      <a:hlink>
+        <a:srgbClr val="0563C1"/>
+      </a:hlink>
+      <a:folHlink>
+        <a:srgbClr val="954F72"/>
+      </a:folHlink>
+    </a:clrScheme>
+    <a:fontScheme name="Office">
+      <a:majorFont>
+        <a:latin typeface="Calibri Light" panose="020F0302020204030204"/>
+        <a:ea typeface=""/>
+        <a:cs typeface=""/>
+        <a:font script="Jpan" typeface="游ゴシック Light"/>
+        <a:font script="Hang" typeface="맑은 고딕"/>
+        <a:font script="Hans" typeface="等线 Light"/>
+        <a:font script="Hant" typeface="新細明體"/>
+        <a:font script="Arab" typeface="Times New Roman"/>
+        <a:font script="Hebr" typeface="Times New Roman"/>
+        <a:font script="Thai" typeface="Angsana New"/>
+        <a:font script="Ethi" typeface="Nyala"/>
+        <a:font script="Beng" typeface="Vrinda"/>
+        <a:font script="Gujr" typeface="Shruti"/>
+        <a:font script="Khmr" typeface="MoolBoran"/>
+        <a:font script="Knda" typeface="Tunga"/>
+        <a:font script="Guru" typeface="Raavi"/>
+        <a:font script="Cans" typeface="Euphemia"/>
+        <a:font script="Cher" typeface="Plantagenet Cherokee"/>
+        <a:font script="Yiii" typeface="Microsoft Yi Baiti"/>
+        <a:font script="Tibt" typeface="Microsoft Himalaya"/>
+        <a:font script="Thaa" typeface="MV Boli"/>
+        <a:font script="Deva" typeface="Mangal"/>
+        <a:font script="Telu" typeface="Gautami"/>
+        <a:font script="Taml" typeface="Latha"/>
+        <a:font script="Syrc" typeface="Estrangelo Edessa"/>
+        <a:font script="Orya" typeface="Kalinga"/>
+        <a:font script="Mlym" typeface="Kartika"/>
+        <a:font script="Laoo" typeface="DokChampa"/>
+        <a:font script="Sinh" typeface="Iskoola Pota"/>
+        <a:font script="Mong" typeface="Mongolian Baiti"/>
+        <a:font script="Viet" typeface="Times New Roman"/>
+        <a:font script="Uigh" typeface="Microsoft Uighur"/>
+        <a:font script="Geor" typeface="Sylfaen"/>
+        <a:font script="Armn" typeface="Arial"/>
+        <a:font script="Bugi" typeface="Leelawadee UI"/>
+        <a:font script="Bopo" typeface="Microsoft JhengHei"/>
+        <a:font script="Java" typeface="Javanese Text"/>
+        <a:font script="Lisu" typeface="Segoe UI"/>
+        <a:font script="Mymr" typeface="Myanmar Text"/>
+        <a:font script="Nkoo" typeface="Ebrima"/>
+        <a:font script="Olck" typeface="Nirmala UI"/>
+        <a:font script="Osma" typeface="Ebrima"/>
+        <a:font script="Phag" typeface="Phagspa"/>
+        <a:font script="Syrn" typeface="Estrangelo Edessa"/>
+        <a:font script="Syrj" typeface="Estrangelo Edessa"/>
+        <a:font script="Syre" typeface="Estrangelo Edessa"/>
+        <a:font script="Sora" typeface="Nirmala UI"/>
+        <a:font script="Tale" typeface="Microsoft Tai Le"/>
+        <a:font script="Talu" typeface="Microsoft New Tai Lue"/>
+        <a:font script="Tfng" typeface="Ebrima"/>
+      </a:majorFont>
+      <a:minorFont>
+        <a:latin typeface="Calibri" panose="020F0502020204030204"/>
+        <a:ea typeface=""/>
+        <a:cs typeface=""/>
+        <a:font script="Jpan" typeface="游ゴシック"/>
+        <a:font script="Hang" typeface="맑은 고딕"/>
+        <a:font script="Hans" typeface="等线"/>
+        <a:font script="Hant" typeface="新細明體"/>
+        <a:font script="Arab" typeface="Arial"/>
+        <a:font script="Hebr" typeface="Arial"/>
+        <a:font script="Thai" typeface="Cordia New"/>
+        <a:font script="Ethi" typeface="Nyala"/>
+        <a:font script="Beng" typeface="Vrinda"/>
+        <a:font script="Gujr" typeface="Shruti"/>
+        <a:font script="Khmr" typeface="DaunPenh"/>
+        <a:font script="Knda" typeface="Tunga"/>
+        <a:font script="Guru" typeface="Raavi"/>
+        <a:font script="Cans" typeface="Euphemia"/>
+        <a:font script="Cher" typeface="Plantagenet Cherokee"/>
+        <a:font script="Yiii" typeface="Microsoft Yi Baiti"/>
+        <a:font script="Tibt" typeface="Microsoft Himalaya"/>
+        <a:font script="Thaa" typeface="MV Boli"/>
+        <a:font script="Deva" typeface="Mangal"/>
+        <a:font script="Telu" typeface="Gautami"/>
+        <a:font script="Taml" typeface="Latha"/>
+        <a:font script="Syrc" typeface="Estrangelo Edessa"/>
+        <a:font script="Orya" typeface="Kalinga"/>
+        <a:font script="Mlym" typeface="Kartika"/>
+        <a:font script="Laoo" typeface="DokChampa"/>
+        <a:font script="Sinh" typeface="Iskoola Pota"/>
+        <a:font script="Mong" typeface="Mongolian Baiti"/>
+        <a:font script="Viet" typeface="Arial"/>
+        <a:font script="Uigh" typeface="Microsoft Uighur"/>
+        <a:font script="Geor" typeface="Sylfaen"/>
+        <a:font script="Armn" typeface="Arial"/>
+        <a:font script="Bugi" typeface="Leelawadee UI"/>
+        <a:font script="Bopo" typeface="Microsoft JhengHei"/>
+        <a:font script="Java" typeface="Javanese Text"/>
+        <a:font script="Lisu" typeface="Segoe UI"/>
+        <a:font script="Mymr" typeface="Myanmar Text"/>
+        <a:font script="Nkoo" typeface="Ebrima"/>
+        <a:font script="Olck" typeface="Nirmala UI"/>
+        <a:font script="Osma" typeface="Ebrima"/>
+        <a:font script="Phag" typeface="Phagspa"/>
+        <a:font script="Syrn" typeface="Estrangelo Edessa"/>
+        <a:font script="Syrj" typeface="Estrangelo Edessa"/>
+        <a:font script="Syre" typeface="Estrangelo Edessa"/>
+        <a:font script="Sora" typeface="Nirmala UI"/>
+        <a:font script="Tale" typeface="Microsoft Tai Le"/>
+        <a:font script="Talu" typeface="Microsoft New Tai Lue"/>
+        <a:font script="Tfng" typeface="Ebrima"/>
+      </a:minorFont>
+    </a:fontScheme>
+    <a:fmtScheme name="Office">
+      <a:fillStyleLst>
+        <a:solidFill>
+          <a:schemeClr val="phClr"/>
+        </a:solidFill>
+        <a:gradFill rotWithShape="1">
+          <a:gsLst>
+            <a:gs pos="0">
+              <a:schemeClr val="phClr">
+                <a:lumMod val="110000"/>
+                <a:satMod val="105000"/>
+                <a:tint val="67000"/>
+              </a:schemeClr>
+            </a:gs>
+            <a:gs pos="50000">
+              <a:schemeClr val="phClr">
+                <a:lumMod val="105000"/>
+                <a:satMod val="103000"/>
+                <a:tint val="73000"/>
+              </a:schemeClr>
+            </a:gs>
+            <a:gs pos="100000">
+              <a:schemeClr val="phClr">
+                <a:lumMod val="105000"/>
+                <a:satMod val="109000"/>
+                <a:tint val="81000"/>
+              </a:schemeClr>
+            </a:gs>
+          </a:gsLst>
+          <a:lin ang="5400000" scaled="0"/>
+        </a:gradFill>
+        <a:gradFill rotWithShape="1">
+          <a:gsLst>
+            <a:gs pos="0">
+              <a:schemeClr val="phClr">
+                <a:satMod val="103000"/>
+                <a:lumMod val="102000"/>
+                <a:tint val="94000"/>
+              </a:schemeClr>
+            </a:gs>
+            <a:gs pos="50000">
+              <a:schemeClr val="phClr">
+                <a:satMod val="110000"/>
+                <a:lumMod val="100000"/>
+                <a:shade val="100000"/>
+              </a:schemeClr>
+            </a:gs>
+            <a:gs pos="100000">
+              <a:schemeClr val="phClr">
+                <a:lumMod val="99000"/>
+                <a:satMod val="120000"/>
+                <a:shade val="78000"/>
+              </a:schemeClr>
+            </a:gs>
+          </a:gsLst>
+          <a:lin ang="5400000" scaled="0"/>
+        </a:gradFill>
+      </a:fillStyleLst>
+      <a:lnStyleLst>
+        <a:ln w="6350" cap="flat" cmpd="sng" algn="ctr">
+          <a:solidFill>
+            <a:schemeClr val="phClr"/>
+          </a:solidFill>
+          <a:prstDash val="solid"/>
+          <a:miter lim="800000"/>
+        </a:ln>
+        <a:ln w="12700" cap="flat" cmpd="sng" algn="ctr">
+          <a:solidFill>
+            <a:schemeClr val="phClr"/>
+          </a:solidFill>
+          <a:prstDash val="solid"/>
+          <a:miter lim="800000"/>
+        </a:ln>
+        <a:ln w="19050" cap="flat" cmpd="sng" algn="ctr">
+          <a:solidFill>
+            <a:schemeClr val="phClr"/>
+          </a:solidFill>
+          <a:prstDash val="solid"/>
+          <a:miter lim="800000"/>
+        </a:ln>
+      </a:lnStyleLst>
+      <a:effectStyleLst>
+        <a:effectStyle>
+          <a:effectLst/>
+        </a:effectStyle>
+        <a:effectStyle>
+          <a:effectLst/>
+        </a:effectStyle>
+        <a:effectStyle>
+          <a:effectLst>
+            <a:outerShdw blurRad="57150" dist="19050" dir="5400000" algn="ctr" rotWithShape="0">
+              <a:srgbClr val="000000">
+                <a:alpha val="63000"/>
+              </a:srgbClr>
+            </a:outerShdw>
+          </a:effectLst>
+        </a:effectStyle>
+      </a:effectStyleLst>
+      <a:bgFillStyleLst>
+        <a:solidFill>
+          <a:schemeClr val="phClr"/>
+        </a:solidFill>
+        <a:solidFill>
+          <a:schemeClr val="phClr">
+            <a:tint val="95000"/>
+            <a:satMod val="170000"/>
+          </a:schemeClr>
+        </a:solidFill>
+        <a:gradFill rotWithShape="1">
+          <a:gsLst>
+            <a:gs pos="0">
+              <a:schemeClr val="phClr">
+                <a:tint val="93000"/>
+                <a:satMod val="150000"/>
+                <a:shade val="98000"/>
+                <a:lumMod val="102000"/>
+              </a:schemeClr>
+            </a:gs>
+            <a:gs pos="50000">
+              <a:schemeClr val="phClr">
+                <a:tint val="98000"/>
+                <a:satMod val="130000"/>
+                <a:shade val="90000"/>
+                <a:lumMod val="103000"/>
+              </a:schemeClr>
+            </a:gs>
+            <a:gs pos="100000">
+              <a:schemeClr val="phClr">
+                <a:shade val="63000"/>
+                <a:satMod val="120000"/>
+              </a:schemeClr>
+            </a:gs>
+          </a:gsLst>
+          <a:lin ang="5400000" scaled="0"/>
+        </a:gradFill>
+      </a:bgFillStyleLst>
+    </a:fmtScheme>
+  </a:themeElements>
+  <a:objectDefaults/>
+  <a:extraClrSchemeLst/>
+  <a:extLst>
+    <a:ext uri="{05A4C25C-085E-4340-85A3-A5531E510DB2}">
+      <thm15:themeFamily xmlns:thm15="http://schemas.microsoft.com/office/thememl/2012/main" name="Office Theme" id="{62F939B6-93AF-4DB8-9C6B-D6C7DFDC589F}" vid="{4A3C46E8-61CC-4603-A589-7422A47A8E4A}"/>
+    </a:ext>
+  </a:extLst>
+</a:theme>
+</file>
+
+<file path=ppt/theme/theme3.xml><?xml version="1.0" encoding="utf-8"?>
+<a:theme xmlns:a="http://schemas.openxmlformats.org/drawingml/2006/main" name="Office Theme">
+  <a:themeElements>
+    <a:clrScheme name="Office">
+      <a:dk1>
+        <a:sysClr val="windowText" lastClr="000000"/>
+      </a:dk1>
+      <a:lt1>
+        <a:sysClr val="window" lastClr="FFFFFF"/>
+      </a:lt1>
+      <a:dk2>
+        <a:srgbClr val="44546A"/>
+      </a:dk2>
+      <a:lt2>
+        <a:srgbClr val="E7E6E6"/>
+      </a:lt2>
+      <a:accent1>
+        <a:srgbClr val="4472C4"/>
+      </a:accent1>
+      <a:accent2>
+        <a:srgbClr val="ED7D31"/>
+      </a:accent2>
+      <a:accent3>
+        <a:srgbClr val="A5A5A5"/>
+      </a:accent3>
+      <a:accent4>
+        <a:srgbClr val="FFC000"/>
+      </a:accent4>
+      <a:accent5>
+        <a:srgbClr val="5B9BD5"/>
+      </a:accent5>
+      <a:accent6>
+        <a:srgbClr val="70AD47"/>
+      </a:accent6>
+      <a:hlink>
+        <a:srgbClr val="0563C1"/>
+      </a:hlink>
+      <a:folHlink>
+        <a:srgbClr val="954F72"/>
+      </a:folHlink>
+    </a:clrScheme>
+    <a:fontScheme name="Office">
+      <a:majorFont>
+        <a:latin typeface="Calibri Light" panose="020F0302020204030204"/>
+        <a:ea typeface=""/>
+        <a:cs typeface=""/>
+        <a:font script="Jpan" typeface="游ゴシック Light"/>
+        <a:font script="Hang" typeface="맑은 고딕"/>
+        <a:font script="Hans" typeface="等线 Light"/>
+        <a:font script="Hant" typeface="新細明體"/>
+        <a:font script="Arab" typeface="Times New Roman"/>
+        <a:font script="Hebr" typeface="Times New Roman"/>
+        <a:font script="Thai" typeface="Angsana New"/>
+        <a:font script="Ethi" typeface="Nyala"/>
+        <a:font script="Beng" typeface="Vrinda"/>
+        <a:font script="Gujr" typeface="Shruti"/>
+        <a:font script="Khmr" typeface="MoolBoran"/>
+        <a:font script="Knda" typeface="Tunga"/>
+        <a:font script="Guru" typeface="Raavi"/>
+        <a:font script="Cans" typeface="Euphemia"/>
+        <a:font script="Cher" typeface="Plantagenet Cherokee"/>
+        <a:font script="Yiii" typeface="Microsoft Yi Baiti"/>
+        <a:font script="Tibt" typeface="Microsoft Himalaya"/>
+        <a:font script="Thaa" typeface="MV Boli"/>
+        <a:font script="Deva" typeface="Mangal"/>
+        <a:font script="Telu" typeface="Gautami"/>
+        <a:font script="Taml" typeface="Latha"/>
+        <a:font script="Syrc" typeface="Estrangelo Edessa"/>
+        <a:font script="Orya" typeface="Kalinga"/>
+        <a:font script="Mlym" typeface="Kartika"/>
+        <a:font script="Laoo" typeface="DokChampa"/>
+        <a:font script="Sinh" typeface="Iskoola Pota"/>
+        <a:font script="Mong" typeface="Mongolian Baiti"/>
+        <a:font script="Viet" typeface="Times New Roman"/>
+        <a:font script="Uigh" typeface="Microsoft Uighur"/>
+        <a:font script="Geor" typeface="Sylfaen"/>
+        <a:font script="Armn" typeface="Arial"/>
+        <a:font script="Bugi" typeface="Leelawadee UI"/>
+        <a:font script="Bopo" typeface="Microsoft JhengHei"/>
+        <a:font script="Java" typeface="Javanese Text"/>
+        <a:font script="Lisu" typeface="Segoe UI"/>
+        <a:font script="Mymr" typeface="Myanmar Text"/>
+        <a:font script="Nkoo" typeface="Ebrima"/>
+        <a:font script="Olck" typeface="Nirmala UI"/>
+        <a:font script="Osma" typeface="Ebrima"/>
+        <a:font script="Phag" typeface="Phagspa"/>
+        <a:font script="Syrn" typeface="Estrangelo Edessa"/>
+        <a:font script="Syrj" typeface="Estrangelo Edessa"/>
+        <a:font script="Syre" typeface="Estrangelo Edessa"/>
+        <a:font script="Sora" typeface="Nirmala UI"/>
+        <a:font script="Tale" typeface="Microsoft Tai Le"/>
+        <a:font script="Talu" typeface="Microsoft New Tai Lue"/>
+        <a:font script="Tfng" typeface="Ebrima"/>
+      </a:majorFont>
+      <a:minorFont>
+        <a:latin typeface="Calibri" panose="020F0502020204030204"/>
+        <a:ea typeface=""/>
+        <a:cs typeface=""/>
+        <a:font script="Jpan" typeface="游ゴシック"/>
+        <a:font script="Hang" typeface="맑은 고딕"/>
+        <a:font script="Hans" typeface="等线"/>
+        <a:font script="Hant" typeface="新細明體"/>
+        <a:font script="Arab" typeface="Arial"/>
+        <a:font script="Hebr" typeface="Arial"/>
+        <a:font script="Thai" typeface="Cordia New"/>
+        <a:font script="Ethi" typeface="Nyala"/>
+        <a:font script="Beng" typeface="Vrinda"/>
+        <a:font script="Gujr" typeface="Shruti"/>
+        <a:font script="Khmr" typeface="DaunPenh"/>
+        <a:font script="Knda" typeface="Tunga"/>
+        <a:font script="Guru" typeface="Raavi"/>
+        <a:font script="Cans" typeface="Euphemia"/>
+        <a:font script="Cher" typeface="Plantagenet Cherokee"/>
+        <a:font script="Yiii" typeface="Microsoft Yi Baiti"/>
+        <a:font script="Tibt" typeface="Microsoft Himalaya"/>
+        <a:font script="Thaa" typeface="MV Boli"/>
+        <a:font script="Deva" typeface="Mangal"/>
+        <a:font script="Telu" typeface="Gautami"/>
+        <a:font script="Taml" typeface="Latha"/>
+        <a:font script="Syrc" typeface="Estrangelo Edessa"/>
+        <a:font script="Orya" typeface="Kalinga"/>
+        <a:font script="Mlym" typeface="Kartika"/>
+        <a:font script="Laoo" typeface="DokChampa"/>
+        <a:font script="Sinh" typeface="Iskoola Pota"/>
+        <a:font script="Mong" typeface="Mongolian Baiti"/>
+        <a:font script="Viet" typeface="Arial"/>
+        <a:font script="Uigh" typeface="Microsoft Uighur"/>
+        <a:font script="Geor" typeface="Sylfaen"/>
+        <a:font script="Armn" typeface="Arial"/>
+        <a:font script="Bugi" typeface="Leelawadee UI"/>
+        <a:font script="Bopo" typeface="Microsoft JhengHei"/>
+        <a:font script="Java" typeface="Javanese Text"/>
+        <a:font script="Lisu" typeface="Segoe UI"/>
+        <a:font script="Mymr" typeface="Myanmar Text"/>
+        <a:font script="Nkoo" typeface="Ebrima"/>
+        <a:font script="Olck" typeface="Nirmala UI"/>
+        <a:font script="Osma" typeface="Ebrima"/>
+        <a:font script="Phag" typeface="Phagspa"/>
+        <a:font script="Syrn" typeface="Estrangelo Edessa"/>
+        <a:font script="Syrj" typeface="Estrangelo Edessa"/>
+        <a:font script="Syre" typeface="Estrangelo Edessa"/>
+        <a:font script="Sora" typeface="Nirmala UI"/>
+        <a:font script="Tale" typeface="Microsoft Tai Le"/>
+        <a:font script="Talu" typeface="Microsoft New Tai Lue"/>
+        <a:font script="Tfng" typeface="Ebrima"/>
+      </a:minorFont>
+    </a:fontScheme>
+    <a:fmtScheme name="Office">
+      <a:fillStyleLst>
+        <a:solidFill>
+          <a:schemeClr val="phClr"/>
+        </a:solidFill>
+        <a:gradFill rotWithShape="1">
+          <a:gsLst>
+            <a:gs pos="0">
+              <a:schemeClr val="phClr">
+                <a:lumMod val="110000"/>
+                <a:satMod val="105000"/>
+                <a:tint val="67000"/>
+              </a:schemeClr>
+            </a:gs>
+            <a:gs pos="50000">
+              <a:schemeClr val="phClr">
+                <a:lumMod val="105000"/>
+                <a:satMod val="103000"/>
+                <a:tint val="73000"/>
+              </a:schemeClr>
+            </a:gs>
+            <a:gs pos="100000">
+              <a:schemeClr val="phClr">
+                <a:lumMod val="105000"/>
+                <a:satMod val="109000"/>
+                <a:tint val="81000"/>
+              </a:schemeClr>
+            </a:gs>
+          </a:gsLst>
+          <a:lin ang="5400000" scaled="0"/>
+        </a:gradFill>
+        <a:gradFill rotWithShape="1">
+          <a:gsLst>
+            <a:gs pos="0">
+              <a:schemeClr val="phClr">
+                <a:satMod val="103000"/>
+                <a:lumMod val="102000"/>
+                <a:tint val="94000"/>
+              </a:schemeClr>
+            </a:gs>
+            <a:gs pos="50000">
+              <a:schemeClr val="phClr">
+                <a:satMod val="110000"/>
+                <a:lumMod val="100000"/>
+                <a:shade val="100000"/>
+              </a:schemeClr>
+            </a:gs>
+            <a:gs pos="100000">
+              <a:schemeClr val="phClr">
+                <a:lumMod val="99000"/>
+                <a:satMod val="120000"/>
+                <a:shade val="78000"/>
+              </a:schemeClr>
+            </a:gs>
+          </a:gsLst>
+          <a:lin ang="5400000" scaled="0"/>
+        </a:gradFill>
+      </a:fillStyleLst>
+      <a:lnStyleLst>
+        <a:ln w="6350" cap="flat" cmpd="sng" algn="ctr">
+          <a:solidFill>
+            <a:schemeClr val="phClr"/>
+          </a:solidFill>
+          <a:prstDash val="solid"/>
+          <a:miter lim="800000"/>
+        </a:ln>
+        <a:ln w="12700" cap="flat" cmpd="sng" algn="ctr">
+          <a:solidFill>
+            <a:schemeClr val="phClr"/>
+          </a:solidFill>
+          <a:prstDash val="solid"/>
+          <a:miter lim="800000"/>
+        </a:ln>
+        <a:ln w="19050" cap="flat" cmpd="sng" algn="ctr">
+          <a:solidFill>
+            <a:schemeClr val="phClr"/>
+          </a:solidFill>
+          <a:prstDash val="solid"/>
+          <a:miter lim="800000"/>
+        </a:ln>
+      </a:lnStyleLst>
+      <a:effectStyleLst>
+        <a:effectStyle>
+          <a:effectLst/>
+        </a:effectStyle>
+        <a:effectStyle>
+          <a:effectLst/>
+        </a:effectStyle>
+        <a:effectStyle>
+          <a:effectLst>
+            <a:outerShdw blurRad="57150" dist="19050" dir="5400000" algn="ctr" rotWithShape="0">
+              <a:srgbClr val="000000">
+                <a:alpha val="63000"/>
+              </a:srgbClr>
+            </a:outerShdw>
+          </a:effectLst>
+        </a:effectStyle>
+      </a:effectStyleLst>
+      <a:bgFillStyleLst>
+        <a:solidFill>
+          <a:schemeClr val="phClr"/>
+        </a:solidFill>
+        <a:solidFill>
+          <a:schemeClr val="phClr">
+            <a:tint val="95000"/>
+            <a:satMod val="170000"/>
+          </a:schemeClr>
+        </a:solidFill>
+        <a:gradFill rotWithShape="1">
+          <a:gsLst>
+            <a:gs pos="0">
+              <a:schemeClr val="phClr">
+                <a:tint val="93000"/>
+                <a:satMod val="150000"/>
+                <a:shade val="98000"/>
+                <a:lumMod val="102000"/>
+              </a:schemeClr>
+            </a:gs>
+            <a:gs pos="50000">
+              <a:schemeClr val="phClr">
+                <a:tint val="98000"/>
+                <a:satMod val="130000"/>
+                <a:shade val="90000"/>
+                <a:lumMod val="103000"/>
+              </a:schemeClr>
+            </a:gs>
+            <a:gs pos="100000">
+              <a:schemeClr val="phClr">
+                <a:shade val="63000"/>
+                <a:satMod val="120000"/>
+              </a:schemeClr>
+            </a:gs>
+          </a:gsLst>
+          <a:lin ang="5400000" scaled="0"/>
+        </a:gradFill>
+      </a:bgFillStyleLst>
+    </a:fmtScheme>
+  </a:themeElements>
+  <a:objectDefaults/>
+  <a:extraClrSchemeLst/>
+  <a:extLst>
+    <a:ext uri="{05A4C25C-085E-4340-85A3-A5531E510DB2}">
+      <thm15:themeFamily xmlns:thm15="http://schemas.microsoft.com/office/thememl/2012/main" name="Office Theme" id="{62F939B6-93AF-4DB8-9C6B-D6C7DFDC589F}" vid="{4A3C46E8-61CC-4603-A589-7422A47A8E4A}"/>
+    </a:ext>
+  </a:extLst>
+</a:theme>
 </file>
</xml_diff>